<commit_message>
Added Josh's changes to Powerpoint and cleaned up Release Plan. Added a PDF since just having an ODT was causing issues.
</commit_message>
<xml_diff>
--- a/doc/Initial_Presentation.pptx
+++ b/doc/Initial_Presentation.pptx
@@ -1180,7 +1180,7 @@
   <p:cSld>
     <p:spTree>
       <p:nvGrpSpPr>
-        <p:cNvPr id="84" name="Shape 84"/>
+        <p:cNvPr id="83" name="Shape 83"/>
         <p:cNvGrpSpPr/>
         <p:nvPr/>
       </p:nvGrpSpPr>
@@ -1194,7 +1194,7 @@
       </p:grpSpPr>
       <p:sp>
         <p:nvSpPr>
-          <p:cNvPr id="85" name="Shape 85"/>
+          <p:cNvPr id="84" name="Shape 84"/>
           <p:cNvSpPr/>
           <p:nvPr>
             <p:ph idx="2" type="sldImg"/>
@@ -1240,7 +1240,7 @@
       </p:sp>
       <p:sp>
         <p:nvSpPr>
-          <p:cNvPr id="86" name="Shape 86"/>
+          <p:cNvPr id="85" name="Shape 85"/>
           <p:cNvSpPr/>
           <p:nvPr/>
         </p:nvSpPr>
@@ -1292,7 +1292,7 @@
       </p:sp>
       <p:sp>
         <p:nvSpPr>
-          <p:cNvPr id="87" name="Shape 87"/>
+          <p:cNvPr id="86" name="Shape 86"/>
           <p:cNvSpPr txBox="1"/>
           <p:nvPr>
             <p:ph idx="1" type="body"/>
@@ -3437,7 +3437,7 @@
         <p:spPr>
           <a:xfrm>
             <a:off y="53577" x="6934200"/>
-            <a:ext cy="671512" cx="2209799"/>
+            <a:ext cy="671400" cx="2209799"/>
           </a:xfrm>
           <a:prstGeom prst="rect">
             <a:avLst/>
@@ -3473,16 +3473,10 @@
           </a:bodyPr>
           <a:lstStyle/>
           <a:p>
-            <a:pPr algn="l" rtl="0" lvl="0" marR="0" indent="0" marL="0">
-              <a:lnSpc>
-                <a:spcPct val="100000"/>
-              </a:lnSpc>
-              <a:spcBef>
-                <a:spcPts val="0"/>
-              </a:spcBef>
-              <a:spcAft>
-                <a:spcPts val="0"/>
-              </a:spcAft>
+            <a:pPr rtl="0" lvl="0">
+              <a:spcBef>
+                <a:spcPts val="0"/>
+              </a:spcBef>
               <a:buClr>
                 <a:srgbClr val="17375E"/>
               </a:buClr>
@@ -3491,7 +3485,7 @@
               <a:buNone/>
             </a:pPr>
             <a:r>
-              <a:rPr strike="noStrike" u="none" b="1" cap="none" baseline="0" sz="4200" lang="en" i="0">
+              <a:rPr b="1" sz="3200" lang="en">
                 <a:solidFill>
                   <a:srgbClr val="17375E"/>
                 </a:solidFill>
@@ -3500,8 +3494,38 @@
                 <a:cs typeface="Times New Roman"/>
                 <a:sym typeface="Times New Roman"/>
               </a:rPr>
-              <a:t>Project Release Plan</a:t>
-            </a:r>
+              <a:t>Honey Badgers Inc WCMS Project</a:t>
+            </a:r>
+          </a:p>
+          <a:p>
+            <a:pPr algn="l" rtl="0" lvl="0" marR="0" indent="0" marL="0">
+              <a:lnSpc>
+                <a:spcPct val="100000"/>
+              </a:lnSpc>
+              <a:spcBef>
+                <a:spcPts val="0"/>
+              </a:spcBef>
+              <a:spcAft>
+                <a:spcPts val="0"/>
+              </a:spcAft>
+              <a:buClr>
+                <a:srgbClr val="17375E"/>
+              </a:buClr>
+              <a:buFont typeface="Times New Roman"/>
+              <a:buNone/>
+            </a:pPr>
+            <a:r>
+              <a:t/>
+            </a:r>
+            <a:endParaRPr b="1" sz="4200">
+              <a:solidFill>
+                <a:srgbClr val="17375E"/>
+              </a:solidFill>
+              <a:latin typeface="Times New Roman"/>
+              <a:ea typeface="Times New Roman"/>
+              <a:cs typeface="Times New Roman"/>
+              <a:sym typeface="Times New Roman"/>
+            </a:endParaRPr>
           </a:p>
         </p:txBody>
       </p:sp>
@@ -3513,8 +3537,8 @@
         </p:nvSpPr>
         <p:spPr>
           <a:xfrm>
-            <a:off y="2107700" x="457200"/>
-            <a:ext cy="2765699" cx="8229600"/>
+            <a:off y="2450825" x="457200"/>
+            <a:ext cy="2422500" cx="8229600"/>
           </a:xfrm>
           <a:prstGeom prst="rect">
             <a:avLst/>
@@ -3537,12 +3561,12 @@
               <a:buClr>
                 <a:schemeClr val="dk1"/>
               </a:buClr>
-              <a:buSzPct val="39285"/>
+              <a:buSzPct val="61111"/>
               <a:buFont typeface="Arial"/>
               <a:buNone/>
             </a:pPr>
             <a:r>
-              <a:rPr sz="2800" lang="en">
+              <a:rPr sz="1800" lang="en">
                 <a:solidFill>
                   <a:schemeClr val="dk1"/>
                 </a:solidFill>
@@ -3568,12 +3592,12 @@
               <a:buClr>
                 <a:schemeClr val="dk1"/>
               </a:buClr>
-              <a:buSzPct val="39285"/>
+              <a:buSzPct val="61111"/>
               <a:buFont typeface="Arial"/>
               <a:buNone/>
             </a:pPr>
             <a:r>
-              <a:rPr sz="2800" lang="en">
+              <a:rPr sz="1800" lang="en">
                 <a:latin typeface="Times New Roman"/>
                 <a:ea typeface="Times New Roman"/>
                 <a:cs typeface="Times New Roman"/>
@@ -3596,12 +3620,12 @@
               <a:buClr>
                 <a:schemeClr val="dk1"/>
               </a:buClr>
-              <a:buSzPct val="39285"/>
+              <a:buSzPct val="61111"/>
               <a:buFont typeface="Arial"/>
               <a:buNone/>
             </a:pPr>
             <a:r>
-              <a:rPr sz="2800" lang="en">
+              <a:rPr sz="1800" lang="en">
                 <a:latin typeface="Times New Roman"/>
                 <a:ea typeface="Times New Roman"/>
                 <a:cs typeface="Times New Roman"/>
@@ -3624,12 +3648,12 @@
               <a:buClr>
                 <a:schemeClr val="dk1"/>
               </a:buClr>
-              <a:buSzPct val="39285"/>
+              <a:buSzPct val="61111"/>
               <a:buFont typeface="Arial"/>
               <a:buNone/>
             </a:pPr>
             <a:r>
-              <a:rPr sz="2800" lang="en">
+              <a:rPr sz="1800" lang="en">
                 <a:latin typeface="Times New Roman"/>
                 <a:ea typeface="Times New Roman"/>
                 <a:cs typeface="Times New Roman"/>
@@ -3652,12 +3676,12 @@
               <a:buClr>
                 <a:schemeClr val="dk1"/>
               </a:buClr>
-              <a:buSzPct val="39285"/>
+              <a:buSzPct val="61111"/>
               <a:buFont typeface="Arial"/>
               <a:buNone/>
             </a:pPr>
             <a:r>
-              <a:rPr sz="2800" lang="en">
+              <a:rPr sz="1800" lang="en">
                 <a:latin typeface="Times New Roman"/>
                 <a:ea typeface="Times New Roman"/>
                 <a:cs typeface="Times New Roman"/>
@@ -3676,8 +3700,8 @@
         </p:nvSpPr>
         <p:spPr>
           <a:xfrm>
-            <a:off y="784626" x="457200"/>
-            <a:ext cy="1323000" cx="8377799"/>
+            <a:off y="784625" x="457200"/>
+            <a:ext cy="1666200" cx="8377799"/>
           </a:xfrm>
           <a:prstGeom prst="rect">
             <a:avLst/>
@@ -3693,6 +3717,33 @@
           </a:bodyPr>
           <a:lstStyle/>
           <a:p>
+            <a:pPr algn="l" rtl="0" lvl="0" marR="0" indent="0" marL="0">
+              <a:lnSpc>
+                <a:spcPct val="100000"/>
+              </a:lnSpc>
+              <a:spcBef>
+                <a:spcPts val="0"/>
+              </a:spcBef>
+              <a:spcAft>
+                <a:spcPts val="0"/>
+              </a:spcAft>
+              <a:buClr>
+                <a:srgbClr val="000000"/>
+              </a:buClr>
+              <a:buFont typeface="Times New Roman"/>
+              <a:buNone/>
+            </a:pPr>
+            <a:r>
+              <a:t/>
+            </a:r>
+            <a:endParaRPr>
+              <a:latin typeface="Times New Roman"/>
+              <a:ea typeface="Times New Roman"/>
+              <a:cs typeface="Times New Roman"/>
+              <a:sym typeface="Times New Roman"/>
+            </a:endParaRPr>
+          </a:p>
+          <a:p>
             <a:pPr algn="ctr" rtl="0" lvl="0" marR="0" indent="0" marL="0">
               <a:lnSpc>
                 <a:spcPct val="100000"/>
@@ -3717,19 +3768,10 @@
                 <a:cs typeface="Times New Roman"/>
                 <a:sym typeface="Times New Roman"/>
               </a:rPr>
-              <a:t>10/15/14</a:t>
-            </a:r>
-            <a:r>
-              <a:rPr sz="4000" lang="en">
-                <a:latin typeface="Times New Roman"/>
-                <a:ea typeface="Times New Roman"/>
-                <a:cs typeface="Times New Roman"/>
-                <a:sym typeface="Times New Roman"/>
-              </a:rPr>
-              <a:t>Honey Badgers Inc*/FantomCMS</a:t>
-            </a:r>
-            <a:r>
-              <a:rPr strike="noStrike" u="none" b="0" cap="none" baseline="0" sz="4000" lang="en" i="0">
+              <a:t>Fantom WCMS</a:t>
+            </a:r>
+            <a:r>
+              <a:rPr strike="noStrike" u="none" b="0" cap="none" baseline="0" sz="3000" lang="en" i="0">
                 <a:solidFill>
                   <a:srgbClr val="000000"/>
                 </a:solidFill>
@@ -3739,6 +3781,34 @@
                 <a:sym typeface="Times New Roman"/>
               </a:rPr>
               <a:t> </a:t>
+            </a:r>
+          </a:p>
+          <a:p>
+            <a:pPr algn="ctr" rtl="0" lvl="0" marR="0" indent="0" marL="0">
+              <a:lnSpc>
+                <a:spcPct val="100000"/>
+              </a:lnSpc>
+              <a:spcBef>
+                <a:spcPts val="0"/>
+              </a:spcBef>
+              <a:spcAft>
+                <a:spcPts val="0"/>
+              </a:spcAft>
+              <a:buClr>
+                <a:srgbClr val="000000"/>
+              </a:buClr>
+              <a:buSzPct val="25000"/>
+              <a:buFont typeface="Times New Roman"/>
+              <a:buNone/>
+            </a:pPr>
+            <a:r>
+              <a:rPr sz="1200" lang="en">
+                <a:latin typeface="Times New Roman"/>
+                <a:ea typeface="Times New Roman"/>
+                <a:cs typeface="Times New Roman"/>
+                <a:sym typeface="Times New Roman"/>
+              </a:rPr>
+              <a:t>(Web Content Management System)</a:t>
             </a:r>
           </a:p>
         </p:txBody>
@@ -3917,8 +3987,8 @@
         </p:blipFill>
         <p:spPr>
           <a:xfrm>
-            <a:off y="0" x="6934200"/>
-            <a:ext cy="671512" cx="2209799"/>
+            <a:off y="71700" x="6934200"/>
+            <a:ext cy="671400" cx="2209799"/>
           </a:xfrm>
           <a:prstGeom prst="rect">
             <a:avLst/>
@@ -3954,16 +4024,10 @@
           </a:bodyPr>
           <a:lstStyle/>
           <a:p>
-            <a:pPr algn="l" rtl="0" lvl="0" marR="0" indent="0" marL="0">
-              <a:lnSpc>
-                <a:spcPct val="100000"/>
-              </a:lnSpc>
-              <a:spcBef>
-                <a:spcPts val="0"/>
-              </a:spcBef>
-              <a:spcAft>
-                <a:spcPts val="0"/>
-              </a:spcAft>
+            <a:pPr rtl="0" lvl="0">
+              <a:spcBef>
+                <a:spcPts val="0"/>
+              </a:spcBef>
               <a:buClr>
                 <a:srgbClr val="17375E"/>
               </a:buClr>
@@ -3972,7 +4036,7 @@
               <a:buNone/>
             </a:pPr>
             <a:r>
-              <a:rPr strike="noStrike" u="none" b="1" cap="none" baseline="0" sz="4200" lang="en" i="0">
+              <a:rPr b="1" sz="3200" lang="en">
                 <a:solidFill>
                   <a:srgbClr val="17375E"/>
                 </a:solidFill>
@@ -3981,8 +4045,38 @@
                 <a:cs typeface="Times New Roman"/>
                 <a:sym typeface="Times New Roman"/>
               </a:rPr>
-              <a:t>Project Release Plan</a:t>
-            </a:r>
+              <a:t>Honey Badgers Inc WCMS Project</a:t>
+            </a:r>
+          </a:p>
+          <a:p>
+            <a:pPr algn="l" rtl="0" lvl="0" marR="0" indent="0" marL="0">
+              <a:lnSpc>
+                <a:spcPct val="100000"/>
+              </a:lnSpc>
+              <a:spcBef>
+                <a:spcPts val="0"/>
+              </a:spcBef>
+              <a:spcAft>
+                <a:spcPts val="0"/>
+              </a:spcAft>
+              <a:buClr>
+                <a:srgbClr val="17375E"/>
+              </a:buClr>
+              <a:buFont typeface="Times New Roman"/>
+              <a:buNone/>
+            </a:pPr>
+            <a:r>
+              <a:t/>
+            </a:r>
+            <a:endParaRPr b="1" sz="4200">
+              <a:solidFill>
+                <a:srgbClr val="17375E"/>
+              </a:solidFill>
+              <a:latin typeface="Times New Roman"/>
+              <a:ea typeface="Times New Roman"/>
+              <a:cs typeface="Times New Roman"/>
+              <a:sym typeface="Times New Roman"/>
+            </a:endParaRPr>
           </a:p>
         </p:txBody>
       </p:sp>
@@ -4038,19 +4132,7 @@
                 <a:cs typeface="Times New Roman"/>
                 <a:sym typeface="Times New Roman"/>
               </a:rPr>
-              <a:t>Honey Badgers Inc*/FantomCMS</a:t>
-            </a:r>
-            <a:r>
-              <a:rPr strike="noStrike" u="none" b="0" cap="none" baseline="0" sz="4400" lang="en" i="0">
-                <a:solidFill>
-                  <a:srgbClr val="000000"/>
-                </a:solidFill>
-                <a:latin typeface="Times New Roman"/>
-                <a:ea typeface="Times New Roman"/>
-                <a:cs typeface="Times New Roman"/>
-                <a:sym typeface="Times New Roman"/>
-              </a:rPr>
-              <a:t> </a:t>
+              <a:t>Intro</a:t>
             </a:r>
           </a:p>
         </p:txBody>
@@ -4131,7 +4213,7 @@
                 <a:cs typeface="Times New Roman"/>
                 <a:sym typeface="Times New Roman"/>
               </a:rPr>
-              <a:t>FantomCMS aims to create a modular, customizable Content Management System implementing new HTML5 and AJAX technologies.</a:t>
+              <a:t>Fantom WCMS aims to create a modular, customizable Web Content Management System implementing new HTML5 and AJAX technologies.</a:t>
             </a:r>
           </a:p>
         </p:txBody>
@@ -4241,7 +4323,7 @@
               <a:buNone/>
             </a:pPr>
             <a:r>
-              <a:rPr strike="noStrike" u="none" b="1" cap="none" baseline="0" sz="3200" lang="en" i="0">
+              <a:rPr b="1" sz="3200" lang="en">
                 <a:solidFill>
                   <a:srgbClr val="17375E"/>
                 </a:solidFill>
@@ -4250,7 +4332,7 @@
                 <a:cs typeface="Times New Roman"/>
                 <a:sym typeface="Times New Roman"/>
               </a:rPr>
-              <a:t>Project Release Plan – User Stories</a:t>
+              <a:t>Honey Badgers Inc WCMS Project</a:t>
             </a:r>
           </a:p>
         </p:txBody>
@@ -4263,8 +4345,8 @@
         </p:nvSpPr>
         <p:spPr>
           <a:xfrm>
-            <a:off y="666750" x="533400"/>
-            <a:ext cy="857250" cx="8229600"/>
+            <a:off y="666750" x="1449850"/>
+            <a:ext cy="857400" cx="7313100"/>
           </a:xfrm>
           <a:prstGeom prst="rect">
             <a:avLst/>
@@ -4280,7 +4362,7 @@
           </a:bodyPr>
           <a:lstStyle/>
           <a:p>
-            <a:pPr algn="ctr" rtl="0" lvl="0">
+            <a:pPr algn="l" rtl="0" lvl="0">
               <a:spcBef>
                 <a:spcPts val="0"/>
               </a:spcBef>
@@ -4301,19 +4383,7 @@
                 <a:cs typeface="Times New Roman"/>
                 <a:sym typeface="Times New Roman"/>
               </a:rPr>
-              <a:t>Honey Badgers Inc*/FantomCMS</a:t>
-            </a:r>
-            <a:r>
-              <a:rPr sz="4400" lang="en">
-                <a:solidFill>
-                  <a:schemeClr val="dk1"/>
-                </a:solidFill>
-                <a:latin typeface="Times New Roman"/>
-                <a:ea typeface="Times New Roman"/>
-                <a:cs typeface="Times New Roman"/>
-                <a:sym typeface="Times New Roman"/>
-              </a:rPr>
-              <a:t> </a:t>
+              <a:t>Sprint One</a:t>
             </a:r>
           </a:p>
         </p:txBody>
@@ -4326,8 +4396,8 @@
         </p:nvSpPr>
         <p:spPr>
           <a:xfrm>
-            <a:off y="1600200" x="457200"/>
-            <a:ext cy="2994299" cx="8229600"/>
+            <a:off y="1600200" x="1449850"/>
+            <a:ext cy="2994299" cx="7236900"/>
           </a:xfrm>
           <a:prstGeom prst="rect">
             <a:avLst/>
@@ -4356,19 +4426,18 @@
               <a:buClr>
                 <a:schemeClr val="dk1"/>
               </a:buClr>
-              <a:buSzPct val="100000"/>
               <a:buFont typeface="Arial"/>
               <a:buNone/>
             </a:pPr>
             <a:r>
-              <a:rPr sz="1100" lang="en">
-                <a:latin typeface="Times New Roman"/>
-                <a:ea typeface="Times New Roman"/>
-                <a:cs typeface="Times New Roman"/>
-                <a:sym typeface="Times New Roman"/>
-              </a:rPr>
-              <a:t>Sprint 1</a:t>
-            </a:r>
+              <a:t/>
+            </a:r>
+            <a:endParaRPr sz="1100">
+              <a:latin typeface="Times New Roman"/>
+              <a:ea typeface="Times New Roman"/>
+              <a:cs typeface="Times New Roman"/>
+              <a:sym typeface="Times New Roman"/>
+            </a:endParaRPr>
           </a:p>
           <a:p>
             <a:pPr algn="l" rtl="0" lvl="0" marR="0" indent="0" marL="0">
@@ -4771,16 +4840,10 @@
           </a:bodyPr>
           <a:lstStyle/>
           <a:p>
-            <a:pPr algn="l" rtl="0" lvl="0" marR="0" indent="0" marL="0">
-              <a:lnSpc>
-                <a:spcPct val="100000"/>
-              </a:lnSpc>
-              <a:spcBef>
-                <a:spcPts val="0"/>
-              </a:spcBef>
-              <a:spcAft>
-                <a:spcPts val="0"/>
-              </a:spcAft>
+            <a:pPr rtl="0" lvl="0">
+              <a:spcBef>
+                <a:spcPts val="0"/>
+              </a:spcBef>
               <a:buClr>
                 <a:srgbClr val="17375E"/>
               </a:buClr>
@@ -4789,7 +4852,7 @@
               <a:buNone/>
             </a:pPr>
             <a:r>
-              <a:rPr strike="noStrike" u="none" b="1" cap="none" baseline="0" sz="3200" lang="en" i="0">
+              <a:rPr b="1" sz="3200" lang="en">
                 <a:solidFill>
                   <a:srgbClr val="17375E"/>
                 </a:solidFill>
@@ -4798,8 +4861,38 @@
                 <a:cs typeface="Times New Roman"/>
                 <a:sym typeface="Times New Roman"/>
               </a:rPr>
-              <a:t>Project Release Plan – User Stories</a:t>
-            </a:r>
+              <a:t>Honey Badgers Inc WCMS Project</a:t>
+            </a:r>
+          </a:p>
+          <a:p>
+            <a:pPr algn="l" rtl="0" lvl="0" marR="0" indent="0" marL="0">
+              <a:lnSpc>
+                <a:spcPct val="100000"/>
+              </a:lnSpc>
+              <a:spcBef>
+                <a:spcPts val="0"/>
+              </a:spcBef>
+              <a:spcAft>
+                <a:spcPts val="0"/>
+              </a:spcAft>
+              <a:buClr>
+                <a:srgbClr val="17375E"/>
+              </a:buClr>
+              <a:buFont typeface="Times New Roman"/>
+              <a:buNone/>
+            </a:pPr>
+            <a:r>
+              <a:t/>
+            </a:r>
+            <a:endParaRPr b="1" sz="3200">
+              <a:solidFill>
+                <a:srgbClr val="17375E"/>
+              </a:solidFill>
+              <a:latin typeface="Times New Roman"/>
+              <a:ea typeface="Times New Roman"/>
+              <a:cs typeface="Times New Roman"/>
+              <a:sym typeface="Times New Roman"/>
+            </a:endParaRPr>
           </a:p>
         </p:txBody>
       </p:sp>
@@ -4811,8 +4904,8 @@
         </p:nvSpPr>
         <p:spPr>
           <a:xfrm>
-            <a:off y="666750" x="533400"/>
-            <a:ext cy="857400" cx="8229600"/>
+            <a:off y="666750" x="1472850"/>
+            <a:ext cy="857400" cx="7290299"/>
           </a:xfrm>
           <a:prstGeom prst="rect">
             <a:avLst/>
@@ -4828,7 +4921,7 @@
           </a:bodyPr>
           <a:lstStyle/>
           <a:p>
-            <a:pPr algn="ctr" rtl="0" lvl="0">
+            <a:pPr algn="l" rtl="0" lvl="0">
               <a:spcBef>
                 <a:spcPts val="0"/>
               </a:spcBef>
@@ -4849,19 +4942,7 @@
                 <a:cs typeface="Times New Roman"/>
                 <a:sym typeface="Times New Roman"/>
               </a:rPr>
-              <a:t>Honey Badgers Inc*/FantomCMS</a:t>
-            </a:r>
-            <a:r>
-              <a:rPr sz="4400" lang="en">
-                <a:solidFill>
-                  <a:schemeClr val="dk1"/>
-                </a:solidFill>
-                <a:latin typeface="Times New Roman"/>
-                <a:ea typeface="Times New Roman"/>
-                <a:cs typeface="Times New Roman"/>
-                <a:sym typeface="Times New Roman"/>
-              </a:rPr>
-              <a:t> </a:t>
+              <a:t>Sprint Two</a:t>
             </a:r>
           </a:p>
         </p:txBody>
@@ -4874,8 +4955,8 @@
         </p:nvSpPr>
         <p:spPr>
           <a:xfrm>
-            <a:off y="1600200" x="457200"/>
-            <a:ext cy="2994299" cx="8229600"/>
+            <a:off y="1600200" x="1472850"/>
+            <a:ext cy="2994299" cx="7213799"/>
           </a:xfrm>
           <a:prstGeom prst="rect">
             <a:avLst/>
@@ -4904,6 +4985,33 @@
               <a:buClr>
                 <a:schemeClr val="dk1"/>
               </a:buClr>
+              <a:buFont typeface="Arial"/>
+              <a:buNone/>
+            </a:pPr>
+            <a:r>
+              <a:t/>
+            </a:r>
+            <a:endParaRPr sz="1100">
+              <a:latin typeface="Times New Roman"/>
+              <a:ea typeface="Times New Roman"/>
+              <a:cs typeface="Times New Roman"/>
+              <a:sym typeface="Times New Roman"/>
+            </a:endParaRPr>
+          </a:p>
+          <a:p>
+            <a:pPr algn="l" rtl="0" lvl="0" marR="0" indent="0" marL="0">
+              <a:lnSpc>
+                <a:spcPct val="100000"/>
+              </a:lnSpc>
+              <a:spcBef>
+                <a:spcPts val="500"/>
+              </a:spcBef>
+              <a:spcAft>
+                <a:spcPts val="0"/>
+              </a:spcAft>
+              <a:buClr>
+                <a:schemeClr val="dk1"/>
+              </a:buClr>
               <a:buSzPct val="100000"/>
               <a:buFont typeface="Arial"/>
               <a:buNone/>
@@ -4915,7 +5023,7 @@
                 <a:cs typeface="Times New Roman"/>
                 <a:sym typeface="Times New Roman"/>
               </a:rPr>
-              <a:t>Sprint 1</a:t>
+              <a:t> (D) – As a viewer, I want to be able to navigate the website from a central location.</a:t>
             </a:r>
           </a:p>
           <a:p>
@@ -4943,7 +5051,7 @@
                 <a:cs typeface="Times New Roman"/>
                 <a:sym typeface="Times New Roman"/>
               </a:rPr>
-              <a:t> (A) – As a viewer, I want the URL I visit to route me to the appropriate page.</a:t>
+              <a:t> (E) – As a developer, I want to be able to control the flow of state.</a:t>
             </a:r>
           </a:p>
           <a:p>
@@ -4971,7 +5079,7 @@
                 <a:cs typeface="Times New Roman"/>
                 <a:sym typeface="Times New Roman"/>
               </a:rPr>
-              <a:t> (A) – As a developer, I want my server to give the appropriate HTML code on a HTTP request.</a:t>
+              <a:t> (F) – As a content manager, I want to be able to control the colors of the website.</a:t>
             </a:r>
           </a:p>
           <a:p>
@@ -4999,7 +5107,7 @@
                 <a:cs typeface="Times New Roman"/>
                 <a:sym typeface="Times New Roman"/>
               </a:rPr>
-              <a:t> (B) – As a developer, I want to be able to store my information.</a:t>
+              <a:t> (G) – As a content manager, I want to be able to deliver static pages.</a:t>
             </a:r>
           </a:p>
           <a:p>
@@ -5027,91 +5135,7 @@
                 <a:cs typeface="Times New Roman"/>
                 <a:sym typeface="Times New Roman"/>
               </a:rPr>
-              <a:t> (C) – As a content manager, I want to be able to control the users on my website.</a:t>
-            </a:r>
-          </a:p>
-          <a:p>
-            <a:pPr algn="l" rtl="0" lvl="0" marR="0" indent="0" marL="0">
-              <a:lnSpc>
-                <a:spcPct val="100000"/>
-              </a:lnSpc>
-              <a:spcBef>
-                <a:spcPts val="500"/>
-              </a:spcBef>
-              <a:spcAft>
-                <a:spcPts val="0"/>
-              </a:spcAft>
-              <a:buClr>
-                <a:schemeClr val="dk1"/>
-              </a:buClr>
-              <a:buSzPct val="100000"/>
-              <a:buFont typeface="Arial"/>
-              <a:buNone/>
-            </a:pPr>
-            <a:r>
-              <a:rPr sz="1100" lang="en">
-                <a:latin typeface="Times New Roman"/>
-                <a:ea typeface="Times New Roman"/>
-                <a:cs typeface="Times New Roman"/>
-                <a:sym typeface="Times New Roman"/>
-              </a:rPr>
-              <a:t> (C) – As a content manager, I want to be able to edit the settings on my website.</a:t>
-            </a:r>
-          </a:p>
-          <a:p>
-            <a:pPr algn="l" rtl="0" lvl="0" marR="0" indent="0" marL="0">
-              <a:lnSpc>
-                <a:spcPct val="100000"/>
-              </a:lnSpc>
-              <a:spcBef>
-                <a:spcPts val="500"/>
-              </a:spcBef>
-              <a:spcAft>
-                <a:spcPts val="0"/>
-              </a:spcAft>
-              <a:buClr>
-                <a:schemeClr val="dk1"/>
-              </a:buClr>
-              <a:buSzPct val="100000"/>
-              <a:buFont typeface="Arial"/>
-              <a:buNone/>
-            </a:pPr>
-            <a:r>
-              <a:rPr sz="1100" lang="en">
-                <a:latin typeface="Times New Roman"/>
-                <a:ea typeface="Times New Roman"/>
-                <a:cs typeface="Times New Roman"/>
-                <a:sym typeface="Times New Roman"/>
-              </a:rPr>
-              <a:t> (C) – As a developer, I want my web server to be secure.</a:t>
-            </a:r>
-          </a:p>
-          <a:p>
-            <a:pPr algn="l" rtl="0" lvl="0" marR="0" indent="0" marL="0">
-              <a:lnSpc>
-                <a:spcPct val="100000"/>
-              </a:lnSpc>
-              <a:spcBef>
-                <a:spcPts val="500"/>
-              </a:spcBef>
-              <a:spcAft>
-                <a:spcPts val="0"/>
-              </a:spcAft>
-              <a:buClr>
-                <a:schemeClr val="dk1"/>
-              </a:buClr>
-              <a:buSzPct val="100000"/>
-              <a:buFont typeface="Arial"/>
-              <a:buNone/>
-            </a:pPr>
-            <a:r>
-              <a:rPr sz="1100" lang="en">
-                <a:latin typeface="Times New Roman"/>
-                <a:ea typeface="Times New Roman"/>
-                <a:cs typeface="Times New Roman"/>
-                <a:sym typeface="Times New Roman"/>
-              </a:rPr>
-              <a:t> (I) – As a developer, I want to ensure my changes maintain functionality.</a:t>
+              <a:t> (I) – As a developer, I want to ensure my changes maintain functionality. </a:t>
             </a:r>
           </a:p>
           <a:p>
@@ -5148,25 +5172,27 @@
                 <a:spcPct val="100000"/>
               </a:lnSpc>
               <a:spcBef>
-                <a:spcPts val="0"/>
+                <a:spcPts val="500"/>
               </a:spcBef>
               <a:spcAft>
                 <a:spcPts val="0"/>
               </a:spcAft>
-              <a:buNone/>
-            </a:pPr>
-            <a:r>
-              <a:t/>
-            </a:r>
-            <a:endParaRPr strike="noStrike" u="none" b="0" cap="none" baseline="0" sz="1100" i="0">
-              <a:solidFill>
-                <a:srgbClr val="000000"/>
-              </a:solidFill>
-              <a:latin typeface="Times New Roman"/>
-              <a:ea typeface="Times New Roman"/>
-              <a:cs typeface="Times New Roman"/>
-              <a:sym typeface="Times New Roman"/>
-            </a:endParaRPr>
+              <a:buClr>
+                <a:schemeClr val="dk1"/>
+              </a:buClr>
+              <a:buSzPct val="100000"/>
+              <a:buFont typeface="Arial"/>
+              <a:buNone/>
+            </a:pPr>
+            <a:r>
+              <a:rPr sz="1100" lang="en">
+                <a:latin typeface="Times New Roman"/>
+                <a:ea typeface="Times New Roman"/>
+                <a:cs typeface="Times New Roman"/>
+                <a:sym typeface="Times New Roman"/>
+              </a:rPr>
+              <a:t> (K) – As a user of the system, I must be able to read the user manual of the FantomCMS.</a:t>
+            </a:r>
           </a:p>
         </p:txBody>
       </p:sp>
@@ -5319,16 +5345,10 @@
           </a:bodyPr>
           <a:lstStyle/>
           <a:p>
-            <a:pPr algn="l" rtl="0" lvl="0" marR="0" indent="0" marL="0">
-              <a:lnSpc>
-                <a:spcPct val="100000"/>
-              </a:lnSpc>
-              <a:spcBef>
-                <a:spcPts val="0"/>
-              </a:spcBef>
-              <a:spcAft>
-                <a:spcPts val="0"/>
-              </a:spcAft>
+            <a:pPr rtl="0" lvl="0">
+              <a:spcBef>
+                <a:spcPts val="0"/>
+              </a:spcBef>
               <a:buClr>
                 <a:srgbClr val="17375E"/>
               </a:buClr>
@@ -5337,7 +5357,7 @@
               <a:buNone/>
             </a:pPr>
             <a:r>
-              <a:rPr strike="noStrike" u="none" b="1" cap="none" baseline="0" sz="3200" lang="en" i="0">
+              <a:rPr b="1" sz="3200" lang="en">
                 <a:solidFill>
                   <a:srgbClr val="17375E"/>
                 </a:solidFill>
@@ -5346,8 +5366,38 @@
                 <a:cs typeface="Times New Roman"/>
                 <a:sym typeface="Times New Roman"/>
               </a:rPr>
-              <a:t>Project Release Plan – User Stories</a:t>
-            </a:r>
+              <a:t>Honey Badgers Inc WCMS Project</a:t>
+            </a:r>
+          </a:p>
+          <a:p>
+            <a:pPr algn="l" rtl="0" lvl="0" marR="0" indent="0" marL="0">
+              <a:lnSpc>
+                <a:spcPct val="100000"/>
+              </a:lnSpc>
+              <a:spcBef>
+                <a:spcPts val="0"/>
+              </a:spcBef>
+              <a:spcAft>
+                <a:spcPts val="0"/>
+              </a:spcAft>
+              <a:buClr>
+                <a:srgbClr val="17375E"/>
+              </a:buClr>
+              <a:buFont typeface="Times New Roman"/>
+              <a:buNone/>
+            </a:pPr>
+            <a:r>
+              <a:t/>
+            </a:r>
+            <a:endParaRPr b="1" sz="3200">
+              <a:solidFill>
+                <a:srgbClr val="17375E"/>
+              </a:solidFill>
+              <a:latin typeface="Times New Roman"/>
+              <a:ea typeface="Times New Roman"/>
+              <a:cs typeface="Times New Roman"/>
+              <a:sym typeface="Times New Roman"/>
+            </a:endParaRPr>
           </a:p>
         </p:txBody>
       </p:sp>
@@ -5359,8 +5409,8 @@
         </p:nvSpPr>
         <p:spPr>
           <a:xfrm>
-            <a:off y="666750" x="533400"/>
-            <a:ext cy="857400" cx="8229600"/>
+            <a:off y="666750" x="1472850"/>
+            <a:ext cy="857400" cx="7290299"/>
           </a:xfrm>
           <a:prstGeom prst="rect">
             <a:avLst/>
@@ -5376,7 +5426,7 @@
           </a:bodyPr>
           <a:lstStyle/>
           <a:p>
-            <a:pPr algn="ctr" rtl="0" lvl="0">
+            <a:pPr algn="l" rtl="0" lvl="0">
               <a:spcBef>
                 <a:spcPts val="0"/>
               </a:spcBef>
@@ -5397,19 +5447,7 @@
                 <a:cs typeface="Times New Roman"/>
                 <a:sym typeface="Times New Roman"/>
               </a:rPr>
-              <a:t>Honey Badgers Inc*/FantomCMS</a:t>
-            </a:r>
-            <a:r>
-              <a:rPr sz="4400" lang="en">
-                <a:solidFill>
-                  <a:schemeClr val="dk1"/>
-                </a:solidFill>
-                <a:latin typeface="Times New Roman"/>
-                <a:ea typeface="Times New Roman"/>
-                <a:cs typeface="Times New Roman"/>
-                <a:sym typeface="Times New Roman"/>
-              </a:rPr>
-              <a:t> </a:t>
+              <a:t>Sprint Three</a:t>
             </a:r>
           </a:p>
         </p:txBody>
@@ -5422,8 +5460,8 @@
         </p:nvSpPr>
         <p:spPr>
           <a:xfrm>
-            <a:off y="1600200" x="457200"/>
-            <a:ext cy="2994299" cx="8229600"/>
+            <a:off y="1600200" x="1472850"/>
+            <a:ext cy="2994299" cx="7213799"/>
           </a:xfrm>
           <a:prstGeom prst="rect">
             <a:avLst/>
@@ -5452,6 +5490,33 @@
               <a:buClr>
                 <a:schemeClr val="dk1"/>
               </a:buClr>
+              <a:buFont typeface="Arial"/>
+              <a:buNone/>
+            </a:pPr>
+            <a:r>
+              <a:t/>
+            </a:r>
+            <a:endParaRPr sz="1100">
+              <a:latin typeface="Times New Roman"/>
+              <a:ea typeface="Times New Roman"/>
+              <a:cs typeface="Times New Roman"/>
+              <a:sym typeface="Times New Roman"/>
+            </a:endParaRPr>
+          </a:p>
+          <a:p>
+            <a:pPr algn="l" rtl="0" lvl="0" marR="0" indent="0" marL="0">
+              <a:lnSpc>
+                <a:spcPct val="100000"/>
+              </a:lnSpc>
+              <a:spcBef>
+                <a:spcPts val="500"/>
+              </a:spcBef>
+              <a:spcAft>
+                <a:spcPts val="0"/>
+              </a:spcAft>
+              <a:buClr>
+                <a:schemeClr val="dk1"/>
+              </a:buClr>
               <a:buSzPct val="100000"/>
               <a:buFont typeface="Arial"/>
               <a:buNone/>
@@ -5463,203 +5528,7 @@
                 <a:cs typeface="Times New Roman"/>
                 <a:sym typeface="Times New Roman"/>
               </a:rPr>
-              <a:t>Sprint 2</a:t>
-            </a:r>
-          </a:p>
-          <a:p>
-            <a:pPr algn="l" rtl="0" lvl="0" marR="0" indent="0" marL="0">
-              <a:lnSpc>
-                <a:spcPct val="100000"/>
-              </a:lnSpc>
-              <a:spcBef>
-                <a:spcPts val="500"/>
-              </a:spcBef>
-              <a:spcAft>
-                <a:spcPts val="0"/>
-              </a:spcAft>
-              <a:buClr>
-                <a:schemeClr val="dk1"/>
-              </a:buClr>
-              <a:buSzPct val="100000"/>
-              <a:buFont typeface="Arial"/>
-              <a:buNone/>
-            </a:pPr>
-            <a:r>
-              <a:rPr sz="1100" lang="en">
-                <a:latin typeface="Times New Roman"/>
-                <a:ea typeface="Times New Roman"/>
-                <a:cs typeface="Times New Roman"/>
-                <a:sym typeface="Times New Roman"/>
-              </a:rPr>
-              <a:t> (D) – As a viewer, I want to be able to navigate the website from a central location.</a:t>
-            </a:r>
-          </a:p>
-          <a:p>
-            <a:pPr algn="l" rtl="0" lvl="0" marR="0" indent="0" marL="0">
-              <a:lnSpc>
-                <a:spcPct val="100000"/>
-              </a:lnSpc>
-              <a:spcBef>
-                <a:spcPts val="500"/>
-              </a:spcBef>
-              <a:spcAft>
-                <a:spcPts val="0"/>
-              </a:spcAft>
-              <a:buClr>
-                <a:schemeClr val="dk1"/>
-              </a:buClr>
-              <a:buSzPct val="100000"/>
-              <a:buFont typeface="Arial"/>
-              <a:buNone/>
-            </a:pPr>
-            <a:r>
-              <a:rPr sz="1100" lang="en">
-                <a:latin typeface="Times New Roman"/>
-                <a:ea typeface="Times New Roman"/>
-                <a:cs typeface="Times New Roman"/>
-                <a:sym typeface="Times New Roman"/>
-              </a:rPr>
-              <a:t> (E) – As a developer, I want to be able to control the flow of state.</a:t>
-            </a:r>
-          </a:p>
-          <a:p>
-            <a:pPr algn="l" rtl="0" lvl="0" marR="0" indent="0" marL="0">
-              <a:lnSpc>
-                <a:spcPct val="100000"/>
-              </a:lnSpc>
-              <a:spcBef>
-                <a:spcPts val="500"/>
-              </a:spcBef>
-              <a:spcAft>
-                <a:spcPts val="0"/>
-              </a:spcAft>
-              <a:buClr>
-                <a:schemeClr val="dk1"/>
-              </a:buClr>
-              <a:buSzPct val="100000"/>
-              <a:buFont typeface="Arial"/>
-              <a:buNone/>
-            </a:pPr>
-            <a:r>
-              <a:rPr sz="1100" lang="en">
-                <a:latin typeface="Times New Roman"/>
-                <a:ea typeface="Times New Roman"/>
-                <a:cs typeface="Times New Roman"/>
-                <a:sym typeface="Times New Roman"/>
-              </a:rPr>
-              <a:t> (F) – As a content manager, I want to be able to control the colors of the website.</a:t>
-            </a:r>
-          </a:p>
-          <a:p>
-            <a:pPr algn="l" rtl="0" lvl="0" marR="0" indent="0" marL="0">
-              <a:lnSpc>
-                <a:spcPct val="100000"/>
-              </a:lnSpc>
-              <a:spcBef>
-                <a:spcPts val="500"/>
-              </a:spcBef>
-              <a:spcAft>
-                <a:spcPts val="0"/>
-              </a:spcAft>
-              <a:buClr>
-                <a:schemeClr val="dk1"/>
-              </a:buClr>
-              <a:buSzPct val="100000"/>
-              <a:buFont typeface="Arial"/>
-              <a:buNone/>
-            </a:pPr>
-            <a:r>
-              <a:rPr sz="1100" lang="en">
-                <a:latin typeface="Times New Roman"/>
-                <a:ea typeface="Times New Roman"/>
-                <a:cs typeface="Times New Roman"/>
-                <a:sym typeface="Times New Roman"/>
-              </a:rPr>
-              <a:t> (G) – As a content manager, I want to be able to deliver static pages.</a:t>
-            </a:r>
-          </a:p>
-          <a:p>
-            <a:pPr algn="l" rtl="0" lvl="0" marR="0" indent="0" marL="0">
-              <a:lnSpc>
-                <a:spcPct val="100000"/>
-              </a:lnSpc>
-              <a:spcBef>
-                <a:spcPts val="500"/>
-              </a:spcBef>
-              <a:spcAft>
-                <a:spcPts val="0"/>
-              </a:spcAft>
-              <a:buClr>
-                <a:schemeClr val="dk1"/>
-              </a:buClr>
-              <a:buSzPct val="100000"/>
-              <a:buFont typeface="Arial"/>
-              <a:buNone/>
-            </a:pPr>
-            <a:r>
-              <a:rPr sz="1100" lang="en">
-                <a:latin typeface="Times New Roman"/>
-                <a:ea typeface="Times New Roman"/>
-                <a:cs typeface="Times New Roman"/>
-                <a:sym typeface="Times New Roman"/>
-              </a:rPr>
-              <a:t> (I) – As a developer, I want to ensure my changes maintain functionality. </a:t>
-            </a:r>
-          </a:p>
-          <a:p>
-            <a:pPr algn="l" rtl="0" lvl="0" marR="0" indent="0" marL="0">
-              <a:lnSpc>
-                <a:spcPct val="100000"/>
-              </a:lnSpc>
-              <a:spcBef>
-                <a:spcPts val="500"/>
-              </a:spcBef>
-              <a:spcAft>
-                <a:spcPts val="0"/>
-              </a:spcAft>
-              <a:buClr>
-                <a:schemeClr val="dk1"/>
-              </a:buClr>
-              <a:buSzPct val="100000"/>
-              <a:buFont typeface="Arial"/>
-              <a:buNone/>
-            </a:pPr>
-            <a:r>
-              <a:rPr sz="1100" lang="en">
-                <a:latin typeface="Times New Roman"/>
-                <a:ea typeface="Times New Roman"/>
-                <a:cs typeface="Times New Roman"/>
-                <a:sym typeface="Times New Roman"/>
-              </a:rPr>
-              <a:t> (J) – As a developer, I want to maintain a organized structure between my fellow developers.</a:t>
-            </a:r>
-          </a:p>
-          <a:p>
-            <a:pPr algn="l" rtl="0" lvl="0" marR="0" indent="0" marL="0">
-              <a:lnSpc>
-                <a:spcPct val="100000"/>
-              </a:lnSpc>
-              <a:spcBef>
-                <a:spcPts val="500"/>
-              </a:spcBef>
-              <a:spcAft>
-                <a:spcPts val="0"/>
-              </a:spcAft>
-              <a:buClr>
-                <a:schemeClr val="dk1"/>
-              </a:buClr>
-              <a:buSzPct val="100000"/>
-              <a:buFont typeface="Arial"/>
-              <a:buNone/>
-            </a:pPr>
-            <a:r>
-              <a:rPr sz="1100" lang="en">
-                <a:latin typeface="Times New Roman"/>
-                <a:ea typeface="Times New Roman"/>
-                <a:cs typeface="Times New Roman"/>
-                <a:sym typeface="Times New Roman"/>
-              </a:rPr>
-              <a:t> (K) – As a user of the system, I must be able to read the user manual of the FantomCMS.</a:t>
+              <a:t>Add content!</a:t>
             </a:r>
           </a:p>
         </p:txBody>
@@ -5813,16 +5682,10 @@
           </a:bodyPr>
           <a:lstStyle/>
           <a:p>
-            <a:pPr algn="l" rtl="0" lvl="0" marR="0" indent="0" marL="0">
-              <a:lnSpc>
-                <a:spcPct val="100000"/>
-              </a:lnSpc>
-              <a:spcBef>
-                <a:spcPts val="0"/>
-              </a:spcBef>
-              <a:spcAft>
-                <a:spcPts val="0"/>
-              </a:spcAft>
+            <a:pPr rtl="0" lvl="0">
+              <a:spcBef>
+                <a:spcPts val="0"/>
+              </a:spcBef>
               <a:buClr>
                 <a:srgbClr val="17375E"/>
               </a:buClr>
@@ -5831,7 +5694,7 @@
               <a:buNone/>
             </a:pPr>
             <a:r>
-              <a:rPr strike="noStrike" u="none" b="1" cap="none" baseline="0" sz="3200" lang="en" i="0">
+              <a:rPr b="1" sz="3200" lang="en">
                 <a:solidFill>
                   <a:srgbClr val="17375E"/>
                 </a:solidFill>
@@ -5840,8 +5703,38 @@
                 <a:cs typeface="Times New Roman"/>
                 <a:sym typeface="Times New Roman"/>
               </a:rPr>
-              <a:t>Project Release Plan – User Stories</a:t>
-            </a:r>
+              <a:t>Honey Badgers Inc WCMS Project</a:t>
+            </a:r>
+          </a:p>
+          <a:p>
+            <a:pPr algn="l" rtl="0" lvl="0" marR="0" indent="0" marL="0">
+              <a:lnSpc>
+                <a:spcPct val="100000"/>
+              </a:lnSpc>
+              <a:spcBef>
+                <a:spcPts val="0"/>
+              </a:spcBef>
+              <a:spcAft>
+                <a:spcPts val="0"/>
+              </a:spcAft>
+              <a:buClr>
+                <a:srgbClr val="17375E"/>
+              </a:buClr>
+              <a:buFont typeface="Times New Roman"/>
+              <a:buNone/>
+            </a:pPr>
+            <a:r>
+              <a:t/>
+            </a:r>
+            <a:endParaRPr b="1" sz="3200">
+              <a:solidFill>
+                <a:srgbClr val="17375E"/>
+              </a:solidFill>
+              <a:latin typeface="Times New Roman"/>
+              <a:ea typeface="Times New Roman"/>
+              <a:cs typeface="Times New Roman"/>
+              <a:sym typeface="Times New Roman"/>
+            </a:endParaRPr>
           </a:p>
         </p:txBody>
       </p:sp>
@@ -5853,71 +5746,8 @@
         </p:nvSpPr>
         <p:spPr>
           <a:xfrm>
-            <a:off y="666750" x="533400"/>
-            <a:ext cy="857400" cx="8229600"/>
-          </a:xfrm>
-          <a:prstGeom prst="rect">
-            <a:avLst/>
-          </a:prstGeom>
-          <a:noFill/>
-          <a:ln>
-            <a:noFill/>
-          </a:ln>
-        </p:spPr>
-        <p:txBody>
-          <a:bodyPr bIns="45700" rIns="91425" lIns="91425" tIns="45700" anchor="ctr" anchorCtr="0">
-            <a:noAutofit/>
-          </a:bodyPr>
-          <a:lstStyle/>
-          <a:p>
-            <a:pPr algn="ctr" rtl="0" lvl="0">
-              <a:spcBef>
-                <a:spcPts val="0"/>
-              </a:spcBef>
-              <a:buClr>
-                <a:schemeClr val="dk1"/>
-              </a:buClr>
-              <a:buSzPct val="25000"/>
-              <a:buFont typeface="Times New Roman"/>
-              <a:buNone/>
-            </a:pPr>
-            <a:r>
-              <a:rPr sz="4000" lang="en">
-                <a:solidFill>
-                  <a:schemeClr val="dk1"/>
-                </a:solidFill>
-                <a:latin typeface="Times New Roman"/>
-                <a:ea typeface="Times New Roman"/>
-                <a:cs typeface="Times New Roman"/>
-                <a:sym typeface="Times New Roman"/>
-              </a:rPr>
-              <a:t>Honey Badgers Inc*/FantomCMS</a:t>
-            </a:r>
-            <a:r>
-              <a:rPr sz="4400" lang="en">
-                <a:solidFill>
-                  <a:schemeClr val="dk1"/>
-                </a:solidFill>
-                <a:latin typeface="Times New Roman"/>
-                <a:ea typeface="Times New Roman"/>
-                <a:cs typeface="Times New Roman"/>
-                <a:sym typeface="Times New Roman"/>
-              </a:rPr>
-              <a:t> </a:t>
-            </a:r>
-          </a:p>
-        </p:txBody>
-      </p:sp>
-      <p:sp>
-        <p:nvSpPr>
-          <p:cNvPr id="82" name="Shape 82"/>
-          <p:cNvSpPr txBox="1"/>
-          <p:nvPr/>
-        </p:nvSpPr>
-        <p:spPr>
-          <a:xfrm>
-            <a:off y="1600200" x="457200"/>
-            <a:ext cy="2994299" cx="8229600"/>
+            <a:off y="1277250" x="457200"/>
+            <a:ext cy="3317100" cx="8229600"/>
           </a:xfrm>
           <a:prstGeom prst="rect">
             <a:avLst/>
@@ -5983,7 +5813,7 @@
       </p:sp>
       <p:sp>
         <p:nvSpPr>
-          <p:cNvPr id="83" name="Shape 83"/>
+          <p:cNvPr id="82" name="Shape 82"/>
           <p:cNvSpPr/>
           <p:nvPr/>
         </p:nvSpPr>
@@ -6055,9 +5885,9 @@
 </file>
 
 <file path=ppt/theme/theme1.xml><?xml version="1.0" encoding="utf-8"?>
-<a:theme xmlns:a="http://schemas.openxmlformats.org/drawingml/2006/main" xmlns:r="http://schemas.openxmlformats.org/officeDocument/2006/relationships" name="modern">
+<a:theme xmlns:a="http://schemas.openxmlformats.org/drawingml/2006/main" xmlns:r="http://schemas.openxmlformats.org/officeDocument/2006/relationships" name="Custom Theme">
   <a:themeElements>
-    <a:clrScheme name="Custom 348">
+    <a:clrScheme name="Default">
       <a:dk1>
         <a:srgbClr val="000000"/>
       </a:dk1>
@@ -6065,34 +5895,34 @@
         <a:srgbClr val="FFFFFF"/>
       </a:lt1>
       <a:dk2>
-        <a:srgbClr val="191919"/>
+        <a:srgbClr val="158158"/>
       </a:dk2>
       <a:lt2>
-        <a:srgbClr val="CCCCCC"/>
+        <a:srgbClr val="F3F3F3"/>
       </a:lt2>
       <a:accent1>
-        <a:srgbClr val="7E5554"/>
+        <a:srgbClr val="058DC7"/>
       </a:accent1>
       <a:accent2>
-        <a:srgbClr val="910A10"/>
+        <a:srgbClr val="50B432"/>
       </a:accent2>
       <a:accent3>
-        <a:srgbClr val="84294D"/>
+        <a:srgbClr val="ED561B"/>
       </a:accent3>
       <a:accent4>
-        <a:srgbClr val="DA823B"/>
+        <a:srgbClr val="EDEF00"/>
       </a:accent4>
       <a:accent5>
-        <a:srgbClr val="625D3C"/>
+        <a:srgbClr val="24CBE5"/>
       </a:accent5>
       <a:accent6>
-        <a:srgbClr val="00384A"/>
+        <a:srgbClr val="64E572"/>
       </a:accent6>
       <a:hlink>
-        <a:srgbClr val="227A78"/>
+        <a:srgbClr val="2200CC"/>
       </a:hlink>
       <a:folHlink>
-        <a:srgbClr val="394749"/>
+        <a:srgbClr val="551A8B"/>
       </a:folHlink>
     </a:clrScheme>
     <a:fontScheme name="Office">
@@ -6649,9 +6479,9 @@
 </file>
 
 <file path=ppt/theme/theme3.xml><?xml version="1.0" encoding="utf-8"?>
-<a:theme xmlns:a="http://schemas.openxmlformats.org/drawingml/2006/main" xmlns:r="http://schemas.openxmlformats.org/officeDocument/2006/relationships" name="Custom Theme">
+<a:theme xmlns:a="http://schemas.openxmlformats.org/drawingml/2006/main" xmlns:r="http://schemas.openxmlformats.org/officeDocument/2006/relationships" name="modern">
   <a:themeElements>
-    <a:clrScheme name="Default">
+    <a:clrScheme name="Custom 348">
       <a:dk1>
         <a:srgbClr val="000000"/>
       </a:dk1>
@@ -6659,34 +6489,34 @@
         <a:srgbClr val="FFFFFF"/>
       </a:lt1>
       <a:dk2>
-        <a:srgbClr val="158158"/>
+        <a:srgbClr val="191919"/>
       </a:dk2>
       <a:lt2>
-        <a:srgbClr val="F3F3F3"/>
+        <a:srgbClr val="CCCCCC"/>
       </a:lt2>
       <a:accent1>
-        <a:srgbClr val="058DC7"/>
+        <a:srgbClr val="7E5554"/>
       </a:accent1>
       <a:accent2>
-        <a:srgbClr val="50B432"/>
+        <a:srgbClr val="910A10"/>
       </a:accent2>
       <a:accent3>
-        <a:srgbClr val="ED561B"/>
+        <a:srgbClr val="84294D"/>
       </a:accent3>
       <a:accent4>
-        <a:srgbClr val="EDEF00"/>
+        <a:srgbClr val="DA823B"/>
       </a:accent4>
       <a:accent5>
-        <a:srgbClr val="24CBE5"/>
+        <a:srgbClr val="625D3C"/>
       </a:accent5>
       <a:accent6>
-        <a:srgbClr val="64E572"/>
+        <a:srgbClr val="00384A"/>
       </a:accent6>
       <a:hlink>
-        <a:srgbClr val="2200CC"/>
+        <a:srgbClr val="227A78"/>
       </a:hlink>
       <a:folHlink>
-        <a:srgbClr val="551A8B"/>
+        <a:srgbClr val="394749"/>
       </a:folHlink>
     </a:clrScheme>
     <a:fontScheme name="Office">

</xml_diff>

<commit_message>
Added Sprint 1 Plan and final version of Initial Presentation. Removed the odt file.
</commit_message>
<xml_diff>
--- a/doc/Initial_Presentation.pptx
+++ b/doc/Initial_Presentation.pptx
@@ -14,6 +14,7 @@
     <p:sldId id="259" r:id="rId9"/>
     <p:sldId id="260" r:id="rId10"/>
     <p:sldId id="261" r:id="rId11"/>
+    <p:sldId id="262" r:id="rId12"/>
   </p:sldIdLst>
   <p:sldSz cy="5143500" cx="9144000"/>
   <p:notesSz cy="9144000" cx="6858000"/>
@@ -1293,6 +1294,165 @@
       <p:sp>
         <p:nvSpPr>
           <p:cNvPr id="86" name="Shape 86"/>
+          <p:cNvSpPr txBox="1"/>
+          <p:nvPr>
+            <p:ph idx="1" type="body"/>
+          </p:nvPr>
+        </p:nvSpPr>
+        <p:spPr>
+          <a:xfrm>
+            <a:off y="4343210" x="686577"/>
+            <a:ext cy="4112100" cx="5483400"/>
+          </a:xfrm>
+          <a:prstGeom prst="rect">
+            <a:avLst/>
+          </a:prstGeom>
+        </p:spPr>
+        <p:txBody>
+          <a:bodyPr bIns="89625" rIns="89625" lIns="89625" tIns="89625" anchor="ctr" anchorCtr="0">
+            <a:noAutofit/>
+          </a:bodyPr>
+          <a:lstStyle/>
+          <a:p>
+            <a:pPr>
+              <a:spcBef>
+                <a:spcPts val="0"/>
+              </a:spcBef>
+              <a:buNone/>
+            </a:pPr>
+            <a:r>
+              <a:t/>
+            </a:r>
+            <a:endParaRPr/>
+          </a:p>
+        </p:txBody>
+      </p:sp>
+    </p:spTree>
+  </p:cSld>
+  <p:clrMapOvr>
+    <a:masterClrMapping/>
+  </p:clrMapOvr>
+</p:notes>
+</file>
+
+<file path=ppt/notesSlides/notesSlide7.xml><?xml version="1.0" encoding="utf-8"?>
+<p:notes xmlns:a="http://schemas.openxmlformats.org/drawingml/2006/main" xmlns:r="http://schemas.openxmlformats.org/officeDocument/2006/relationships" xmlns:mc="http://schemas.openxmlformats.org/markup-compatibility/2006" xmlns:mv="urn:schemas-microsoft-com:mac:vml" xmlns:p="http://schemas.openxmlformats.org/presentationml/2006/main" xmlns:c="http://schemas.openxmlformats.org/drawingml/2006/chart" xmlns:dgm="http://schemas.openxmlformats.org/drawingml/2006/diagram" xmlns:o="urn:schemas-microsoft-com:office:office" xmlns:v="urn:schemas-microsoft-com:vml" xmlns:pvml="urn:schemas-microsoft-com:office:powerpoint" xmlns:com="http://schemas.openxmlformats.org/drawingml/2006/compatibility" xmlns:p14="http://schemas.microsoft.com/office/powerpoint/2010/main" showMasterSp="0" showMasterPhAnim="0">
+  <p:cSld>
+    <p:spTree>
+      <p:nvGrpSpPr>
+        <p:cNvPr id="92" name="Shape 92"/>
+        <p:cNvGrpSpPr/>
+        <p:nvPr/>
+      </p:nvGrpSpPr>
+      <p:grpSpPr>
+        <a:xfrm>
+          <a:off y="0" x="0"/>
+          <a:ext cy="0" cx="0"/>
+          <a:chOff y="0" x="0"/>
+          <a:chExt cy="0" cx="0"/>
+        </a:xfrm>
+      </p:grpSpPr>
+      <p:sp>
+        <p:nvSpPr>
+          <p:cNvPr id="93" name="Shape 93"/>
+          <p:cNvSpPr/>
+          <p:nvPr>
+            <p:ph idx="2" type="sldImg"/>
+          </p:nvPr>
+        </p:nvSpPr>
+        <p:spPr>
+          <a:xfrm>
+            <a:off y="694975" x="1715150"/>
+            <a:ext cy="3428099" cx="3427800"/>
+          </a:xfrm>
+          <a:custGeom>
+            <a:pathLst>
+              <a:path w="120000" extrusionOk="0" h="120000">
+                <a:moveTo>
+                  <a:pt y="0" x="0"/>
+                </a:moveTo>
+                <a:lnTo>
+                  <a:pt y="0" x="120000"/>
+                </a:lnTo>
+                <a:lnTo>
+                  <a:pt y="120000" x="120000"/>
+                </a:lnTo>
+                <a:lnTo>
+                  <a:pt y="120000" x="0"/>
+                </a:lnTo>
+                <a:close/>
+              </a:path>
+            </a:pathLst>
+          </a:custGeom>
+          <a:solidFill>
+            <a:srgbClr val="FFFFFF"/>
+          </a:solidFill>
+          <a:ln w="9525" cap="flat">
+            <a:solidFill>
+              <a:srgbClr val="000000"/>
+            </a:solidFill>
+            <a:prstDash val="solid"/>
+            <a:miter/>
+            <a:headEnd w="med" len="med" type="none"/>
+            <a:tailEnd w="med" len="med" type="none"/>
+          </a:ln>
+        </p:spPr>
+      </p:sp>
+      <p:sp>
+        <p:nvSpPr>
+          <p:cNvPr id="94" name="Shape 94"/>
+          <p:cNvSpPr/>
+          <p:nvPr/>
+        </p:nvSpPr>
+        <p:spPr>
+          <a:xfrm>
+            <a:off y="4343210" x="686577"/>
+            <a:ext cy="4115100" cx="5486399"/>
+          </a:xfrm>
+          <a:prstGeom prst="rect">
+            <a:avLst/>
+          </a:prstGeom>
+          <a:noFill/>
+          <a:ln>
+            <a:noFill/>
+          </a:ln>
+        </p:spPr>
+        <p:txBody>
+          <a:bodyPr bIns="44800" rIns="89625" lIns="89625" tIns="44800" anchor="ctr" anchorCtr="0">
+            <a:noAutofit/>
+          </a:bodyPr>
+          <a:lstStyle/>
+          <a:p>
+            <a:pPr algn="l" rtl="0" lvl="0" marR="0" indent="0" marL="0">
+              <a:lnSpc>
+                <a:spcPct val="100000"/>
+              </a:lnSpc>
+              <a:spcBef>
+                <a:spcPts val="0"/>
+              </a:spcBef>
+              <a:spcAft>
+                <a:spcPts val="0"/>
+              </a:spcAft>
+              <a:buNone/>
+            </a:pPr>
+            <a:r>
+              <a:t/>
+            </a:r>
+            <a:endParaRPr strike="noStrike" u="none" b="0" cap="none" baseline="0" sz="1800" i="0">
+              <a:solidFill>
+                <a:srgbClr val="000000"/>
+              </a:solidFill>
+              <a:latin typeface="Arial"/>
+              <a:ea typeface="Arial"/>
+              <a:cs typeface="Arial"/>
+              <a:sym typeface="Arial"/>
+            </a:endParaRPr>
+          </a:p>
+        </p:txBody>
+      </p:sp>
+      <p:sp>
+        <p:nvSpPr>
+          <p:cNvPr id="95" name="Shape 95"/>
           <p:cNvSpPr txBox="1"/>
           <p:nvPr>
             <p:ph idx="1" type="body"/>
@@ -3494,7 +3654,7 @@
                 <a:cs typeface="Times New Roman"/>
                 <a:sym typeface="Times New Roman"/>
               </a:rPr>
-              <a:t>Honey Badgers Inc WCMS Project</a:t>
+              <a:t>Honey Badgers Inc CMS Project</a:t>
             </a:r>
           </a:p>
           <a:p>
@@ -3659,7 +3819,7 @@
                 <a:cs typeface="Times New Roman"/>
                 <a:sym typeface="Times New Roman"/>
               </a:rPr>
-              <a:t>Isaac Lean</a:t>
+              <a:t>Matthew Isaac Lean</a:t>
             </a:r>
           </a:p>
           <a:p>
@@ -3768,7 +3928,7 @@
                 <a:cs typeface="Times New Roman"/>
                 <a:sym typeface="Times New Roman"/>
               </a:rPr>
-              <a:t>Fantom WCMS</a:t>
+              <a:t>FantomCMS</a:t>
             </a:r>
             <a:r>
               <a:rPr strike="noStrike" u="none" b="0" cap="none" baseline="0" sz="3000" lang="en" i="0">
@@ -3808,7 +3968,7 @@
                 <a:cs typeface="Times New Roman"/>
                 <a:sym typeface="Times New Roman"/>
               </a:rPr>
-              <a:t>(Web Content Management System)</a:t>
+              <a:t>(Content Management System)</a:t>
             </a:r>
           </a:p>
         </p:txBody>
@@ -4045,7 +4205,7 @@
                 <a:cs typeface="Times New Roman"/>
                 <a:sym typeface="Times New Roman"/>
               </a:rPr>
-              <a:t>Honey Badgers Inc WCMS Project</a:t>
+              <a:t>Honey Badgers Inc CMS Project</a:t>
             </a:r>
           </a:p>
           <a:p>
@@ -4213,7 +4373,7 @@
                 <a:cs typeface="Times New Roman"/>
                 <a:sym typeface="Times New Roman"/>
               </a:rPr>
-              <a:t>Fantom WCMS aims to create a modular, customizable Web Content Management System implementing new HTML5 and AJAX technologies.</a:t>
+              <a:t>Fantom CMS aims to create a modular, customizable Content Management System implementing new HTML5 and AJAX technologies.</a:t>
             </a:r>
           </a:p>
         </p:txBody>
@@ -4332,7 +4492,7 @@
                 <a:cs typeface="Times New Roman"/>
                 <a:sym typeface="Times New Roman"/>
               </a:rPr>
-              <a:t>Honey Badgers Inc WCMS Project</a:t>
+              <a:t>Honey Badgers Inc CMS Project</a:t>
             </a:r>
           </a:p>
         </p:txBody>
@@ -4383,7 +4543,7 @@
                 <a:cs typeface="Times New Roman"/>
                 <a:sym typeface="Times New Roman"/>
               </a:rPr>
-              <a:t>Sprint One</a:t>
+              <a:t>Sprint One - System Core</a:t>
             </a:r>
           </a:p>
         </p:txBody>
@@ -4396,8 +4556,8 @@
         </p:nvSpPr>
         <p:spPr>
           <a:xfrm>
-            <a:off y="1600200" x="1449850"/>
-            <a:ext cy="2994299" cx="7236900"/>
+            <a:off y="1600200" x="0"/>
+            <a:ext cy="3362700" cx="9144000"/>
           </a:xfrm>
           <a:prstGeom prst="rect">
             <a:avLst/>
@@ -4415,7 +4575,7 @@
           <a:p>
             <a:pPr algn="l" rtl="0" lvl="0" marR="0" indent="0" marL="0">
               <a:lnSpc>
-                <a:spcPct val="100000"/>
+                <a:spcPct val="150000"/>
               </a:lnSpc>
               <a:spcBef>
                 <a:spcPts val="500"/>
@@ -4426,51 +4586,24 @@
               <a:buClr>
                 <a:schemeClr val="dk1"/>
               </a:buClr>
+              <a:buSzPct val="78571"/>
               <a:buFont typeface="Arial"/>
               <a:buNone/>
             </a:pPr>
             <a:r>
-              <a:t/>
-            </a:r>
-            <a:endParaRPr sz="1100">
-              <a:latin typeface="Times New Roman"/>
-              <a:ea typeface="Times New Roman"/>
-              <a:cs typeface="Times New Roman"/>
-              <a:sym typeface="Times New Roman"/>
-            </a:endParaRPr>
-          </a:p>
-          <a:p>
-            <a:pPr algn="l" rtl="0" lvl="0" marR="0" indent="0" marL="0">
-              <a:lnSpc>
-                <a:spcPct val="100000"/>
-              </a:lnSpc>
-              <a:spcBef>
-                <a:spcPts val="500"/>
-              </a:spcBef>
-              <a:spcAft>
-                <a:spcPts val="0"/>
-              </a:spcAft>
-              <a:buClr>
-                <a:schemeClr val="dk1"/>
-              </a:buClr>
-              <a:buSzPct val="100000"/>
-              <a:buFont typeface="Arial"/>
-              <a:buNone/>
-            </a:pPr>
-            <a:r>
-              <a:rPr sz="1100" lang="en">
+              <a:rPr lang="en">
                 <a:latin typeface="Times New Roman"/>
                 <a:ea typeface="Times New Roman"/>
                 <a:cs typeface="Times New Roman"/>
                 <a:sym typeface="Times New Roman"/>
               </a:rPr>
-              <a:t> (A) – As a viewer, I want the URL I visit to route me to the appropriate page.</a:t>
+              <a:t> As a viewer, I want the URL I visit to route me to the appropriate page.</a:t>
             </a:r>
           </a:p>
           <a:p>
             <a:pPr algn="l" rtl="0" lvl="0" marR="0" indent="0" marL="0">
               <a:lnSpc>
-                <a:spcPct val="100000"/>
+                <a:spcPct val="150000"/>
               </a:lnSpc>
               <a:spcBef>
                 <a:spcPts val="500"/>
@@ -4481,108 +4614,105 @@
               <a:buClr>
                 <a:schemeClr val="dk1"/>
               </a:buClr>
-              <a:buSzPct val="100000"/>
+              <a:buSzPct val="78571"/>
               <a:buFont typeface="Arial"/>
               <a:buNone/>
             </a:pPr>
             <a:r>
-              <a:rPr sz="1100" lang="en">
+              <a:rPr lang="en">
                 <a:latin typeface="Times New Roman"/>
                 <a:ea typeface="Times New Roman"/>
                 <a:cs typeface="Times New Roman"/>
                 <a:sym typeface="Times New Roman"/>
               </a:rPr>
-              <a:t> (A) – As a developer, I want my server to give the appropriate HTML code on a HTTP request.</a:t>
-            </a:r>
-          </a:p>
-          <a:p>
-            <a:pPr algn="l" rtl="0" lvl="0" marR="0" indent="0" marL="0">
+              <a:t> As a developer, I want my server to give the appropriate HTML code on a HTTP request.</a:t>
+            </a:r>
+          </a:p>
+          <a:p>
+            <a:pPr rtl="0" lvl="0">
               <a:lnSpc>
-                <a:spcPct val="100000"/>
+                <a:spcPct val="150000"/>
               </a:lnSpc>
               <a:spcBef>
                 <a:spcPts val="500"/>
               </a:spcBef>
-              <a:spcAft>
-                <a:spcPts val="0"/>
-              </a:spcAft>
               <a:buClr>
                 <a:schemeClr val="dk1"/>
               </a:buClr>
-              <a:buSzPct val="100000"/>
+              <a:buSzPct val="78571"/>
               <a:buFont typeface="Arial"/>
               <a:buNone/>
             </a:pPr>
             <a:r>
-              <a:rPr sz="1100" lang="en">
+              <a:rPr lang="en">
+                <a:solidFill>
+                  <a:schemeClr val="dk1"/>
+                </a:solidFill>
                 <a:latin typeface="Times New Roman"/>
                 <a:ea typeface="Times New Roman"/>
                 <a:cs typeface="Times New Roman"/>
                 <a:sym typeface="Times New Roman"/>
               </a:rPr>
-              <a:t> (B) – As a developer, I want to be able to store my information.</a:t>
-            </a:r>
-          </a:p>
-          <a:p>
-            <a:pPr algn="l" rtl="0" lvl="0" marR="0" indent="0" marL="0">
+              <a:t> As a content manager, I want to be able to control the users on my website.</a:t>
+            </a:r>
+          </a:p>
+          <a:p>
+            <a:pPr rtl="0" lvl="0">
               <a:lnSpc>
-                <a:spcPct val="100000"/>
+                <a:spcPct val="150000"/>
               </a:lnSpc>
               <a:spcBef>
                 <a:spcPts val="500"/>
               </a:spcBef>
-              <a:spcAft>
-                <a:spcPts val="0"/>
-              </a:spcAft>
               <a:buClr>
                 <a:schemeClr val="dk1"/>
               </a:buClr>
-              <a:buSzPct val="100000"/>
+              <a:buSzPct val="78571"/>
               <a:buFont typeface="Arial"/>
               <a:buNone/>
             </a:pPr>
             <a:r>
-              <a:rPr sz="1100" lang="en">
+              <a:rPr lang="en">
+                <a:solidFill>
+                  <a:schemeClr val="dk1"/>
+                </a:solidFill>
                 <a:latin typeface="Times New Roman"/>
                 <a:ea typeface="Times New Roman"/>
                 <a:cs typeface="Times New Roman"/>
                 <a:sym typeface="Times New Roman"/>
               </a:rPr>
-              <a:t> (C) – As a content manager, I want to be able to control the users on my website.</a:t>
-            </a:r>
-          </a:p>
-          <a:p>
-            <a:pPr algn="l" rtl="0" lvl="0" marR="0" indent="0" marL="0">
+              <a:t> As a content manager, I want to be able to edit the settings on my website.</a:t>
+            </a:r>
+          </a:p>
+          <a:p>
+            <a:pPr rtl="0" lvl="0">
               <a:lnSpc>
-                <a:spcPct val="100000"/>
+                <a:spcPct val="150000"/>
               </a:lnSpc>
               <a:spcBef>
                 <a:spcPts val="500"/>
               </a:spcBef>
-              <a:spcAft>
-                <a:spcPts val="0"/>
-              </a:spcAft>
               <a:buClr>
                 <a:schemeClr val="dk1"/>
               </a:buClr>
-              <a:buSzPct val="100000"/>
+              <a:buSzPct val="78571"/>
               <a:buFont typeface="Arial"/>
               <a:buNone/>
             </a:pPr>
             <a:r>
-              <a:rPr sz="1100" lang="en">
+              <a:rPr lang="en">
                 <a:latin typeface="Times New Roman"/>
                 <a:ea typeface="Times New Roman"/>
                 <a:cs typeface="Times New Roman"/>
                 <a:sym typeface="Times New Roman"/>
               </a:rPr>
-              <a:t> (C) – As a content manager, I want to be able to edit the settings on my website.</a:t>
+              <a:t> As a developer, I want to be able to store my information.</a:t>
             </a:r>
           </a:p>
           <a:p>
             <a:pPr algn="l" rtl="0" lvl="0" marR="0" indent="0" marL="0">
               <a:lnSpc>
-                <a:spcPct val="100000"/>
+                <a:spcPct val="150000"/>
               </a:lnSpc>
               <a:spcBef>
                 <a:spcPts val="500"/>
@@ -4593,24 +4723,24 @@
               <a:buClr>
                 <a:schemeClr val="dk1"/>
               </a:buClr>
-              <a:buSzPct val="100000"/>
+              <a:buSzPct val="78571"/>
               <a:buFont typeface="Arial"/>
               <a:buNone/>
             </a:pPr>
             <a:r>
-              <a:rPr sz="1100" lang="en">
+              <a:rPr lang="en">
                 <a:latin typeface="Times New Roman"/>
                 <a:ea typeface="Times New Roman"/>
                 <a:cs typeface="Times New Roman"/>
                 <a:sym typeface="Times New Roman"/>
               </a:rPr>
-              <a:t> (C) – As a developer, I want my web server to be secure.</a:t>
+              <a:t> As a developer, I want my web server to be secure.</a:t>
             </a:r>
           </a:p>
           <a:p>
             <a:pPr algn="l" rtl="0" lvl="0" marR="0" indent="0" marL="0">
               <a:lnSpc>
-                <a:spcPct val="100000"/>
+                <a:spcPct val="150000"/>
               </a:lnSpc>
               <a:spcBef>
                 <a:spcPts val="500"/>
@@ -4621,24 +4751,24 @@
               <a:buClr>
                 <a:schemeClr val="dk1"/>
               </a:buClr>
-              <a:buSzPct val="100000"/>
+              <a:buSzPct val="78571"/>
               <a:buFont typeface="Arial"/>
               <a:buNone/>
             </a:pPr>
             <a:r>
-              <a:rPr sz="1100" lang="en">
+              <a:rPr lang="en">
                 <a:latin typeface="Times New Roman"/>
                 <a:ea typeface="Times New Roman"/>
                 <a:cs typeface="Times New Roman"/>
                 <a:sym typeface="Times New Roman"/>
               </a:rPr>
-              <a:t> (I) – As a developer, I want to ensure my changes maintain functionality.</a:t>
+              <a:t> As a developer, I want to ensure my changes maintain functionality.</a:t>
             </a:r>
           </a:p>
           <a:p>
             <a:pPr algn="l" rtl="0" lvl="0" marR="0" indent="0" marL="0">
               <a:lnSpc>
-                <a:spcPct val="100000"/>
+                <a:spcPct val="150000"/>
               </a:lnSpc>
               <a:spcBef>
                 <a:spcPts val="500"/>
@@ -4649,24 +4779,24 @@
               <a:buClr>
                 <a:schemeClr val="dk1"/>
               </a:buClr>
-              <a:buSzPct val="100000"/>
+              <a:buSzPct val="78571"/>
               <a:buFont typeface="Arial"/>
               <a:buNone/>
             </a:pPr>
             <a:r>
-              <a:rPr sz="1100" lang="en">
+              <a:rPr lang="en">
                 <a:latin typeface="Times New Roman"/>
                 <a:ea typeface="Times New Roman"/>
                 <a:cs typeface="Times New Roman"/>
                 <a:sym typeface="Times New Roman"/>
               </a:rPr>
-              <a:t> (J) – As a developer, I want to maintain a organized structure between my fellow developers.</a:t>
+              <a:t> As a developer, I want to maintain an organized structure between my fellow developers.</a:t>
             </a:r>
           </a:p>
           <a:p>
             <a:pPr algn="l" rtl="0" lvl="0" marR="0" indent="0" marL="0">
               <a:lnSpc>
-                <a:spcPct val="100000"/>
+                <a:spcPct val="150000"/>
               </a:lnSpc>
               <a:spcBef>
                 <a:spcPts val="0"/>
@@ -4679,7 +4809,7 @@
             <a:r>
               <a:t/>
             </a:r>
-            <a:endParaRPr strike="noStrike" u="none" b="0" cap="none" baseline="0" sz="1100" i="0">
+            <a:endParaRPr strike="noStrike" u="none" b="0" cap="none" baseline="0" i="0">
               <a:solidFill>
                 <a:srgbClr val="000000"/>
               </a:solidFill>
@@ -4861,7 +4991,7 @@
                 <a:cs typeface="Times New Roman"/>
                 <a:sym typeface="Times New Roman"/>
               </a:rPr>
-              <a:t>Honey Badgers Inc WCMS Project</a:t>
+              <a:t>Honey Badgers Inc CMS Project</a:t>
             </a:r>
           </a:p>
           <a:p>
@@ -4942,7 +5072,7 @@
                 <a:cs typeface="Times New Roman"/>
                 <a:sym typeface="Times New Roman"/>
               </a:rPr>
-              <a:t>Sprint Two</a:t>
+              <a:t>Sprint Two - Content Apps</a:t>
             </a:r>
           </a:p>
         </p:txBody>
@@ -4955,8 +5085,8 @@
         </p:nvSpPr>
         <p:spPr>
           <a:xfrm>
-            <a:off y="1600200" x="1472850"/>
-            <a:ext cy="2994299" cx="7213799"/>
+            <a:off y="1600200" x="0"/>
+            <a:ext cy="2994299" cx="9023699"/>
           </a:xfrm>
           <a:prstGeom prst="rect">
             <a:avLst/>
@@ -4974,7 +5104,7 @@
           <a:p>
             <a:pPr algn="l" rtl="0" lvl="0" marR="0" indent="0" marL="0">
               <a:lnSpc>
-                <a:spcPct val="100000"/>
+                <a:spcPct val="150000"/>
               </a:lnSpc>
               <a:spcBef>
                 <a:spcPts val="500"/>
@@ -4985,51 +5115,24 @@
               <a:buClr>
                 <a:schemeClr val="dk1"/>
               </a:buClr>
+              <a:buSzPct val="78571"/>
               <a:buFont typeface="Arial"/>
               <a:buNone/>
             </a:pPr>
             <a:r>
-              <a:t/>
-            </a:r>
-            <a:endParaRPr sz="1100">
-              <a:latin typeface="Times New Roman"/>
-              <a:ea typeface="Times New Roman"/>
-              <a:cs typeface="Times New Roman"/>
-              <a:sym typeface="Times New Roman"/>
-            </a:endParaRPr>
-          </a:p>
-          <a:p>
-            <a:pPr algn="l" rtl="0" lvl="0" marR="0" indent="0" marL="0">
-              <a:lnSpc>
-                <a:spcPct val="100000"/>
-              </a:lnSpc>
-              <a:spcBef>
-                <a:spcPts val="500"/>
-              </a:spcBef>
-              <a:spcAft>
-                <a:spcPts val="0"/>
-              </a:spcAft>
-              <a:buClr>
-                <a:schemeClr val="dk1"/>
-              </a:buClr>
-              <a:buSzPct val="100000"/>
-              <a:buFont typeface="Arial"/>
-              <a:buNone/>
-            </a:pPr>
-            <a:r>
-              <a:rPr sz="1100" lang="en">
+              <a:rPr lang="en">
                 <a:latin typeface="Times New Roman"/>
                 <a:ea typeface="Times New Roman"/>
                 <a:cs typeface="Times New Roman"/>
                 <a:sym typeface="Times New Roman"/>
               </a:rPr>
-              <a:t> (D) – As a viewer, I want to be able to navigate the website from a central location.</a:t>
+              <a:t> As a viewer, I want to be able to navigate the website from a central location.</a:t>
             </a:r>
           </a:p>
           <a:p>
             <a:pPr algn="l" rtl="0" lvl="0" marR="0" indent="0" marL="0">
               <a:lnSpc>
-                <a:spcPct val="100000"/>
+                <a:spcPct val="150000"/>
               </a:lnSpc>
               <a:spcBef>
                 <a:spcPts val="500"/>
@@ -5040,24 +5143,24 @@
               <a:buClr>
                 <a:schemeClr val="dk1"/>
               </a:buClr>
-              <a:buSzPct val="100000"/>
+              <a:buSzPct val="78571"/>
               <a:buFont typeface="Arial"/>
               <a:buNone/>
             </a:pPr>
             <a:r>
-              <a:rPr sz="1100" lang="en">
+              <a:rPr lang="en">
                 <a:latin typeface="Times New Roman"/>
                 <a:ea typeface="Times New Roman"/>
                 <a:cs typeface="Times New Roman"/>
                 <a:sym typeface="Times New Roman"/>
               </a:rPr>
-              <a:t> (E) – As a developer, I want to be able to control the flow of state.</a:t>
+              <a:t> As a developer, I want to be able to control the flow of state.</a:t>
             </a:r>
           </a:p>
           <a:p>
             <a:pPr algn="l" rtl="0" lvl="0" marR="0" indent="0" marL="0">
               <a:lnSpc>
-                <a:spcPct val="100000"/>
+                <a:spcPct val="150000"/>
               </a:lnSpc>
               <a:spcBef>
                 <a:spcPts val="500"/>
@@ -5068,24 +5171,24 @@
               <a:buClr>
                 <a:schemeClr val="dk1"/>
               </a:buClr>
-              <a:buSzPct val="100000"/>
+              <a:buSzPct val="78571"/>
               <a:buFont typeface="Arial"/>
               <a:buNone/>
             </a:pPr>
             <a:r>
-              <a:rPr sz="1100" lang="en">
+              <a:rPr lang="en">
                 <a:latin typeface="Times New Roman"/>
                 <a:ea typeface="Times New Roman"/>
                 <a:cs typeface="Times New Roman"/>
                 <a:sym typeface="Times New Roman"/>
               </a:rPr>
-              <a:t> (F) – As a content manager, I want to be able to control the colors of the website.</a:t>
+              <a:t> As a content manager, I want to be able to control the colors of the website.</a:t>
             </a:r>
           </a:p>
           <a:p>
             <a:pPr algn="l" rtl="0" lvl="0" marR="0" indent="0" marL="0">
               <a:lnSpc>
-                <a:spcPct val="100000"/>
+                <a:spcPct val="150000"/>
               </a:lnSpc>
               <a:spcBef>
                 <a:spcPts val="500"/>
@@ -5096,24 +5199,24 @@
               <a:buClr>
                 <a:schemeClr val="dk1"/>
               </a:buClr>
-              <a:buSzPct val="100000"/>
+              <a:buSzPct val="78571"/>
               <a:buFont typeface="Arial"/>
               <a:buNone/>
             </a:pPr>
             <a:r>
-              <a:rPr sz="1100" lang="en">
+              <a:rPr lang="en">
                 <a:latin typeface="Times New Roman"/>
                 <a:ea typeface="Times New Roman"/>
                 <a:cs typeface="Times New Roman"/>
                 <a:sym typeface="Times New Roman"/>
               </a:rPr>
-              <a:t> (G) – As a content manager, I want to be able to deliver static pages.</a:t>
+              <a:t> As a content manager, I want to be able to deliver static pages.</a:t>
             </a:r>
           </a:p>
           <a:p>
             <a:pPr algn="l" rtl="0" lvl="0" marR="0" indent="0" marL="0">
               <a:lnSpc>
-                <a:spcPct val="100000"/>
+                <a:spcPct val="150000"/>
               </a:lnSpc>
               <a:spcBef>
                 <a:spcPts val="500"/>
@@ -5124,24 +5227,24 @@
               <a:buClr>
                 <a:schemeClr val="dk1"/>
               </a:buClr>
-              <a:buSzPct val="100000"/>
+              <a:buSzPct val="78571"/>
               <a:buFont typeface="Arial"/>
               <a:buNone/>
             </a:pPr>
             <a:r>
-              <a:rPr sz="1100" lang="en">
+              <a:rPr lang="en">
                 <a:latin typeface="Times New Roman"/>
                 <a:ea typeface="Times New Roman"/>
                 <a:cs typeface="Times New Roman"/>
                 <a:sym typeface="Times New Roman"/>
               </a:rPr>
-              <a:t> (I) – As a developer, I want to ensure my changes maintain functionality. </a:t>
+              <a:t> As a developer, I want to ensure my changes maintain functionality. </a:t>
             </a:r>
           </a:p>
           <a:p>
             <a:pPr algn="l" rtl="0" lvl="0" marR="0" indent="0" marL="0">
               <a:lnSpc>
-                <a:spcPct val="100000"/>
+                <a:spcPct val="150000"/>
               </a:lnSpc>
               <a:spcBef>
                 <a:spcPts val="500"/>
@@ -5152,24 +5255,24 @@
               <a:buClr>
                 <a:schemeClr val="dk1"/>
               </a:buClr>
-              <a:buSzPct val="100000"/>
+              <a:buSzPct val="78571"/>
               <a:buFont typeface="Arial"/>
               <a:buNone/>
             </a:pPr>
             <a:r>
-              <a:rPr sz="1100" lang="en">
+              <a:rPr lang="en">
                 <a:latin typeface="Times New Roman"/>
                 <a:ea typeface="Times New Roman"/>
                 <a:cs typeface="Times New Roman"/>
                 <a:sym typeface="Times New Roman"/>
               </a:rPr>
-              <a:t> (J) – As a developer, I want to maintain a organized structure between my fellow developers.</a:t>
+              <a:t> As a developer, I want to maintain an organized structure between my fellow developers.</a:t>
             </a:r>
           </a:p>
           <a:p>
             <a:pPr algn="l" rtl="0" lvl="0" marR="0" indent="0" marL="0">
               <a:lnSpc>
-                <a:spcPct val="100000"/>
+                <a:spcPct val="150000"/>
               </a:lnSpc>
               <a:spcBef>
                 <a:spcPts val="500"/>
@@ -5180,18 +5283,18 @@
               <a:buClr>
                 <a:schemeClr val="dk1"/>
               </a:buClr>
-              <a:buSzPct val="100000"/>
+              <a:buSzPct val="78571"/>
               <a:buFont typeface="Arial"/>
               <a:buNone/>
             </a:pPr>
             <a:r>
-              <a:rPr sz="1100" lang="en">
+              <a:rPr lang="en">
                 <a:latin typeface="Times New Roman"/>
                 <a:ea typeface="Times New Roman"/>
                 <a:cs typeface="Times New Roman"/>
                 <a:sym typeface="Times New Roman"/>
               </a:rPr>
-              <a:t> (K) – As a user of the system, I must be able to read the user manual of the FantomCMS.</a:t>
+              <a:t> As a user of the system, I must be able to read the user manual of the FantomCMS.</a:t>
             </a:r>
           </a:p>
         </p:txBody>
@@ -5366,7 +5469,7 @@
                 <a:cs typeface="Times New Roman"/>
                 <a:sym typeface="Times New Roman"/>
               </a:rPr>
-              <a:t>Honey Badgers Inc WCMS Project</a:t>
+              <a:t>Honey Badgers Inc CMS Project</a:t>
             </a:r>
           </a:p>
           <a:p>
@@ -5409,7 +5512,7 @@
         </p:nvSpPr>
         <p:spPr>
           <a:xfrm>
-            <a:off y="666750" x="1472850"/>
+            <a:off y="666750" x="926850"/>
             <a:ext cy="857400" cx="7290299"/>
           </a:xfrm>
           <a:prstGeom prst="rect">
@@ -5447,7 +5550,7 @@
                 <a:cs typeface="Times New Roman"/>
                 <a:sym typeface="Times New Roman"/>
               </a:rPr>
-              <a:t>Sprint Three</a:t>
+              <a:t>Sprint Three - Extensions &amp; Polish</a:t>
             </a:r>
           </a:p>
         </p:txBody>
@@ -5460,8 +5563,8 @@
         </p:nvSpPr>
         <p:spPr>
           <a:xfrm>
-            <a:off y="1600200" x="1472850"/>
-            <a:ext cy="2994299" cx="7213799"/>
+            <a:off y="1643075" x="70375"/>
+            <a:ext cy="2994299" cx="8822100"/>
           </a:xfrm>
           <a:prstGeom prst="rect">
             <a:avLst/>
@@ -5477,58 +5580,164 @@
           </a:bodyPr>
           <a:lstStyle/>
           <a:p>
-            <a:pPr algn="l" rtl="0" lvl="0" marR="0" indent="0" marL="0">
+            <a:pPr rtl="0" indent="0" marL="0">
               <a:lnSpc>
-                <a:spcPct val="100000"/>
+                <a:spcPct val="150000"/>
               </a:lnSpc>
               <a:spcBef>
-                <a:spcPts val="500"/>
-              </a:spcBef>
-              <a:spcAft>
-                <a:spcPts val="0"/>
-              </a:spcAft>
-              <a:buClr>
-                <a:schemeClr val="dk1"/>
-              </a:buClr>
-              <a:buFont typeface="Arial"/>
-              <a:buNone/>
-            </a:pPr>
-            <a:r>
-              <a:t/>
-            </a:r>
-            <a:endParaRPr sz="1100">
-              <a:latin typeface="Times New Roman"/>
-              <a:ea typeface="Times New Roman"/>
-              <a:cs typeface="Times New Roman"/>
-              <a:sym typeface="Times New Roman"/>
-            </a:endParaRPr>
-          </a:p>
-          <a:p>
-            <a:pPr algn="l" rtl="0" lvl="0" marR="0" indent="0" marL="0">
-              <a:lnSpc>
-                <a:spcPct val="100000"/>
-              </a:lnSpc>
-              <a:spcBef>
-                <a:spcPts val="500"/>
-              </a:spcBef>
-              <a:spcAft>
-                <a:spcPts val="0"/>
-              </a:spcAft>
-              <a:buClr>
-                <a:schemeClr val="dk1"/>
-              </a:buClr>
-              <a:buSzPct val="100000"/>
-              <a:buFont typeface="Arial"/>
-              <a:buNone/>
-            </a:pPr>
-            <a:r>
-              <a:rPr sz="1100" lang="en">
+                <a:spcPts val="0"/>
+              </a:spcBef>
+              <a:buNone/>
+            </a:pPr>
+            <a:r>
+              <a:rPr lang="en">
+                <a:solidFill>
+                  <a:schemeClr val="dk1"/>
+                </a:solidFill>
                 <a:latin typeface="Times New Roman"/>
                 <a:ea typeface="Times New Roman"/>
                 <a:cs typeface="Times New Roman"/>
                 <a:sym typeface="Times New Roman"/>
               </a:rPr>
-              <a:t>Add content!</a:t>
+              <a:t>As a content manager, I want to be able to have many options for displaying pictures.</a:t>
+            </a:r>
+          </a:p>
+          <a:p>
+            <a:pPr rtl="0" lvl="0" indent="0" marL="0">
+              <a:lnSpc>
+                <a:spcPct val="150000"/>
+              </a:lnSpc>
+              <a:spcBef>
+                <a:spcPts val="0"/>
+              </a:spcBef>
+              <a:buNone/>
+            </a:pPr>
+            <a:r>
+              <a:rPr lang="en">
+                <a:solidFill>
+                  <a:schemeClr val="dk1"/>
+                </a:solidFill>
+                <a:latin typeface="Times New Roman"/>
+                <a:ea typeface="Times New Roman"/>
+                <a:cs typeface="Times New Roman"/>
+                <a:sym typeface="Times New Roman"/>
+              </a:rPr>
+              <a:t>As a content manager, I want to have a rich audio playing experience.</a:t>
+            </a:r>
+          </a:p>
+          <a:p>
+            <a:pPr rtl="0" lvl="0" indent="0" marL="0">
+              <a:lnSpc>
+                <a:spcPct val="150000"/>
+              </a:lnSpc>
+              <a:spcBef>
+                <a:spcPts val="0"/>
+              </a:spcBef>
+              <a:buNone/>
+            </a:pPr>
+            <a:r>
+              <a:rPr lang="en">
+                <a:solidFill>
+                  <a:schemeClr val="dk1"/>
+                </a:solidFill>
+                <a:latin typeface="Times New Roman"/>
+                <a:ea typeface="Times New Roman"/>
+                <a:cs typeface="Times New Roman"/>
+                <a:sym typeface="Times New Roman"/>
+              </a:rPr>
+              <a:t>As a content manager, I want to be able to control the layout and further control the colors of the website.</a:t>
+            </a:r>
+          </a:p>
+          <a:p>
+            <a:pPr rtl="0" lvl="0" indent="0" marL="0">
+              <a:lnSpc>
+                <a:spcPct val="150000"/>
+              </a:lnSpc>
+              <a:spcBef>
+                <a:spcPts val="0"/>
+              </a:spcBef>
+              <a:buNone/>
+            </a:pPr>
+            <a:r>
+              <a:rPr lang="en">
+                <a:solidFill>
+                  <a:schemeClr val="dk1"/>
+                </a:solidFill>
+                <a:latin typeface="Times New Roman"/>
+                <a:ea typeface="Times New Roman"/>
+                <a:cs typeface="Times New Roman"/>
+                <a:sym typeface="Times New Roman"/>
+              </a:rPr>
+              <a:t>As a content manager, I want to be able to show a gallery of multimedia to the viewer.</a:t>
+            </a:r>
+          </a:p>
+          <a:p>
+            <a:pPr rtl="0" lvl="0" indent="0" marL="0">
+              <a:lnSpc>
+                <a:spcPct val="150000"/>
+              </a:lnSpc>
+              <a:spcBef>
+                <a:spcPts val="0"/>
+              </a:spcBef>
+              <a:buNone/>
+            </a:pPr>
+            <a:r>
+              <a:rPr lang="en">
+                <a:solidFill>
+                  <a:schemeClr val="dk1"/>
+                </a:solidFill>
+                <a:latin typeface="Times New Roman"/>
+                <a:ea typeface="Times New Roman"/>
+                <a:cs typeface="Times New Roman"/>
+                <a:sym typeface="Times New Roman"/>
+              </a:rPr>
+              <a:t>As a developer, I want to ensure my changes maintain functionality.</a:t>
+            </a:r>
+          </a:p>
+          <a:p>
+            <a:pPr rtl="0" lvl="0" indent="0" marL="0">
+              <a:lnSpc>
+                <a:spcPct val="150000"/>
+              </a:lnSpc>
+              <a:spcBef>
+                <a:spcPts val="0"/>
+              </a:spcBef>
+              <a:buNone/>
+            </a:pPr>
+            <a:r>
+              <a:rPr lang="en">
+                <a:solidFill>
+                  <a:schemeClr val="dk1"/>
+                </a:solidFill>
+                <a:latin typeface="Times New Roman"/>
+                <a:ea typeface="Times New Roman"/>
+                <a:cs typeface="Times New Roman"/>
+                <a:sym typeface="Times New Roman"/>
+              </a:rPr>
+              <a:t>As a tester, I need to be able to do software builds and run regression tests.</a:t>
+            </a:r>
+          </a:p>
+          <a:p>
+            <a:pPr rtl="0" lvl="0" indent="0" marL="0">
+              <a:lnSpc>
+                <a:spcPct val="150000"/>
+              </a:lnSpc>
+              <a:spcBef>
+                <a:spcPts val="0"/>
+              </a:spcBef>
+              <a:buNone/>
+            </a:pPr>
+            <a:r>
+              <a:rPr lang="en">
+                <a:solidFill>
+                  <a:schemeClr val="dk1"/>
+                </a:solidFill>
+                <a:latin typeface="Times New Roman"/>
+                <a:ea typeface="Times New Roman"/>
+                <a:cs typeface="Times New Roman"/>
+                <a:sym typeface="Times New Roman"/>
+              </a:rPr>
+              <a:t>As a developer, I want to maintain an organized structure between my fellow developers.</a:t>
             </a:r>
           </a:p>
         </p:txBody>
@@ -5703,7 +5912,7 @@
                 <a:cs typeface="Times New Roman"/>
                 <a:sym typeface="Times New Roman"/>
               </a:rPr>
-              <a:t>Honey Badgers Inc WCMS Project</a:t>
+              <a:t>Honey Badgers Inc CMS Project</a:t>
             </a:r>
           </a:p>
           <a:p>
@@ -5806,7 +6015,7 @@
                 <a:cs typeface="Times New Roman"/>
                 <a:sym typeface="Times New Roman"/>
               </a:rPr>
-              <a:t>Questions?</a:t>
+              <a:t>The Future</a:t>
             </a:r>
           </a:p>
         </p:txBody>
@@ -5814,6 +6023,284 @@
       <p:sp>
         <p:nvSpPr>
           <p:cNvPr id="82" name="Shape 82"/>
+          <p:cNvSpPr/>
+          <p:nvPr/>
+        </p:nvSpPr>
+        <p:spPr>
+          <a:xfrm>
+            <a:off y="4686300" x="0"/>
+            <a:ext cy="457200" cx="9144000"/>
+          </a:xfrm>
+          <a:prstGeom prst="rect">
+            <a:avLst/>
+          </a:prstGeom>
+          <a:gradFill>
+            <a:gsLst>
+              <a:gs pos="0">
+                <a:srgbClr val="1F447F"/>
+              </a:gs>
+              <a:gs pos="100000">
+                <a:srgbClr val="E1E8F5"/>
+              </a:gs>
+            </a:gsLst>
+            <a:lin ang="0" scaled="0"/>
+          </a:gradFill>
+          <a:ln>
+            <a:noFill/>
+          </a:ln>
+        </p:spPr>
+        <p:txBody>
+          <a:bodyPr bIns="45700" rIns="91425" lIns="91425" tIns="45700" anchor="ctr" anchorCtr="0">
+            <a:noAutofit/>
+          </a:bodyPr>
+          <a:lstStyle/>
+          <a:p>
+            <a:pPr algn="l" rtl="0" lvl="0" marR="0" indent="0" marL="0">
+              <a:lnSpc>
+                <a:spcPct val="100000"/>
+              </a:lnSpc>
+              <a:spcBef>
+                <a:spcPts val="0"/>
+              </a:spcBef>
+              <a:spcAft>
+                <a:spcPts val="0"/>
+              </a:spcAft>
+              <a:buNone/>
+            </a:pPr>
+            <a:r>
+              <a:t/>
+            </a:r>
+            <a:endParaRPr strike="noStrike" u="none" b="0" cap="none" baseline="0" sz="1800" i="0">
+              <a:solidFill>
+                <a:srgbClr val="000000"/>
+              </a:solidFill>
+              <a:latin typeface="Arial"/>
+              <a:ea typeface="Arial"/>
+              <a:cs typeface="Arial"/>
+              <a:sym typeface="Arial"/>
+            </a:endParaRPr>
+          </a:p>
+        </p:txBody>
+      </p:sp>
+    </p:spTree>
+  </p:cSld>
+  <p:clrMapOvr>
+    <a:masterClrMapping/>
+  </p:clrMapOvr>
+  <p:transition spd="slow">
+    <p:cut/>
+  </p:transition>
+</p:sld>
+</file>
+
+<file path=ppt/slides/slide7.xml><?xml version="1.0" encoding="utf-8"?>
+<p:sld xmlns:a="http://schemas.openxmlformats.org/drawingml/2006/main" xmlns:r="http://schemas.openxmlformats.org/officeDocument/2006/relationships" xmlns:mc="http://schemas.openxmlformats.org/markup-compatibility/2006" xmlns:mv="urn:schemas-microsoft-com:mac:vml" xmlns:p="http://schemas.openxmlformats.org/presentationml/2006/main" xmlns:c="http://schemas.openxmlformats.org/drawingml/2006/chart" xmlns:dgm="http://schemas.openxmlformats.org/drawingml/2006/diagram" xmlns:o="urn:schemas-microsoft-com:office:office" xmlns:v="urn:schemas-microsoft-com:vml" xmlns:pvml="urn:schemas-microsoft-com:office:powerpoint" xmlns:com="http://schemas.openxmlformats.org/drawingml/2006/compatibility" xmlns:p14="http://schemas.microsoft.com/office/powerpoint/2010/main">
+  <p:cSld>
+    <p:bg>
+      <p:bgPr>
+        <a:solidFill>
+          <a:srgbClr val="FFFFFF"/>
+        </a:solidFill>
+      </p:bgPr>
+    </p:bg>
+    <p:spTree>
+      <p:nvGrpSpPr>
+        <p:cNvPr id="87" name="Shape 87"/>
+        <p:cNvGrpSpPr/>
+        <p:nvPr/>
+      </p:nvGrpSpPr>
+      <p:grpSpPr>
+        <a:xfrm>
+          <a:off y="0" x="0"/>
+          <a:ext cy="0" cx="0"/>
+          <a:chOff y="0" x="0"/>
+          <a:chExt cy="0" cx="0"/>
+        </a:xfrm>
+      </p:grpSpPr>
+      <p:pic>
+        <p:nvPicPr>
+          <p:cNvPr id="88" name="Shape 88"/>
+          <p:cNvPicPr preferRelativeResize="0"/>
+          <p:nvPr/>
+        </p:nvPicPr>
+        <p:blipFill rotWithShape="1">
+          <a:blip r:embed="rId3">
+            <a:alphaModFix/>
+          </a:blip>
+          <a:srcRect t="0" b="0" r="0" l="0"/>
+          <a:stretch/>
+        </p:blipFill>
+        <p:spPr>
+          <a:xfrm>
+            <a:off y="57150" x="6915150"/>
+            <a:ext cy="671400" cx="2209799"/>
+          </a:xfrm>
+          <a:prstGeom prst="rect">
+            <a:avLst/>
+          </a:prstGeom>
+          <a:noFill/>
+          <a:ln>
+            <a:noFill/>
+          </a:ln>
+        </p:spPr>
+      </p:pic>
+      <p:sp>
+        <p:nvSpPr>
+          <p:cNvPr id="89" name="Shape 89"/>
+          <p:cNvSpPr txBox="1"/>
+          <p:nvPr/>
+        </p:nvSpPr>
+        <p:spPr>
+          <a:xfrm>
+            <a:off y="111918" x="152400"/>
+            <a:ext cy="435900" cx="6686400"/>
+          </a:xfrm>
+          <a:prstGeom prst="rect">
+            <a:avLst/>
+          </a:prstGeom>
+          <a:noFill/>
+          <a:ln>
+            <a:noFill/>
+          </a:ln>
+        </p:spPr>
+        <p:txBody>
+          <a:bodyPr bIns="46800" rIns="90000" lIns="90000" tIns="46800" anchor="t" anchorCtr="0">
+            <a:noAutofit/>
+          </a:bodyPr>
+          <a:lstStyle/>
+          <a:p>
+            <a:pPr rtl="0" lvl="0">
+              <a:spcBef>
+                <a:spcPts val="0"/>
+              </a:spcBef>
+              <a:buClr>
+                <a:srgbClr val="17375E"/>
+              </a:buClr>
+              <a:buSzPct val="25000"/>
+              <a:buFont typeface="Times New Roman"/>
+              <a:buNone/>
+            </a:pPr>
+            <a:r>
+              <a:rPr b="1" sz="3200" lang="en">
+                <a:solidFill>
+                  <a:srgbClr val="17375E"/>
+                </a:solidFill>
+                <a:latin typeface="Times New Roman"/>
+                <a:ea typeface="Times New Roman"/>
+                <a:cs typeface="Times New Roman"/>
+                <a:sym typeface="Times New Roman"/>
+              </a:rPr>
+              <a:t>Honey Badgers Inc CMS Project</a:t>
+            </a:r>
+          </a:p>
+          <a:p>
+            <a:pPr algn="l" rtl="0" lvl="0" marR="0" indent="0" marL="0">
+              <a:lnSpc>
+                <a:spcPct val="100000"/>
+              </a:lnSpc>
+              <a:spcBef>
+                <a:spcPts val="0"/>
+              </a:spcBef>
+              <a:spcAft>
+                <a:spcPts val="0"/>
+              </a:spcAft>
+              <a:buClr>
+                <a:srgbClr val="17375E"/>
+              </a:buClr>
+              <a:buFont typeface="Times New Roman"/>
+              <a:buNone/>
+            </a:pPr>
+            <a:r>
+              <a:t/>
+            </a:r>
+            <a:endParaRPr b="1" sz="3200">
+              <a:solidFill>
+                <a:srgbClr val="17375E"/>
+              </a:solidFill>
+              <a:latin typeface="Times New Roman"/>
+              <a:ea typeface="Times New Roman"/>
+              <a:cs typeface="Times New Roman"/>
+              <a:sym typeface="Times New Roman"/>
+            </a:endParaRPr>
+          </a:p>
+        </p:txBody>
+      </p:sp>
+      <p:sp>
+        <p:nvSpPr>
+          <p:cNvPr id="90" name="Shape 90"/>
+          <p:cNvSpPr txBox="1"/>
+          <p:nvPr/>
+        </p:nvSpPr>
+        <p:spPr>
+          <a:xfrm>
+            <a:off y="1277250" x="457200"/>
+            <a:ext cy="3317100" cx="8229600"/>
+          </a:xfrm>
+          <a:prstGeom prst="rect">
+            <a:avLst/>
+          </a:prstGeom>
+          <a:noFill/>
+          <a:ln>
+            <a:noFill/>
+          </a:ln>
+        </p:spPr>
+        <p:txBody>
+          <a:bodyPr bIns="45700" rIns="91425" lIns="91425" tIns="45700" anchor="t" anchorCtr="0">
+            <a:noAutofit/>
+          </a:bodyPr>
+          <a:lstStyle/>
+          <a:p>
+            <a:pPr algn="l" rtl="0" lvl="0" marR="0" indent="0" marL="0">
+              <a:lnSpc>
+                <a:spcPct val="150000"/>
+              </a:lnSpc>
+              <a:spcBef>
+                <a:spcPts val="0"/>
+              </a:spcBef>
+              <a:spcAft>
+                <a:spcPts val="0"/>
+              </a:spcAft>
+              <a:buNone/>
+            </a:pPr>
+            <a:r>
+              <a:t/>
+            </a:r>
+            <a:endParaRPr sz="3600">
+              <a:latin typeface="Times New Roman"/>
+              <a:ea typeface="Times New Roman"/>
+              <a:cs typeface="Times New Roman"/>
+              <a:sym typeface="Times New Roman"/>
+            </a:endParaRPr>
+          </a:p>
+          <a:p>
+            <a:pPr algn="ctr" rtl="0" lvl="0" marR="0" indent="0" marL="0">
+              <a:lnSpc>
+                <a:spcPct val="150000"/>
+              </a:lnSpc>
+              <a:spcBef>
+                <a:spcPts val="0"/>
+              </a:spcBef>
+              <a:spcAft>
+                <a:spcPts val="0"/>
+              </a:spcAft>
+              <a:buSzPct val="25000"/>
+              <a:buNone/>
+            </a:pPr>
+            <a:r>
+              <a:rPr sz="3600" lang="en">
+                <a:latin typeface="Times New Roman"/>
+                <a:ea typeface="Times New Roman"/>
+                <a:cs typeface="Times New Roman"/>
+                <a:sym typeface="Times New Roman"/>
+              </a:rPr>
+              <a:t>Questions?</a:t>
+            </a:r>
+          </a:p>
+        </p:txBody>
+      </p:sp>
+      <p:sp>
+        <p:nvSpPr>
+          <p:cNvPr id="91" name="Shape 91"/>
           <p:cNvSpPr/>
           <p:nvPr/>
         </p:nvSpPr>

</xml_diff>